<commit_message>
add getting started, dict overview and ner user guide
</commit_message>
<xml_diff>
--- a/images/images.pptx
+++ b/images/images.pptx
@@ -14,6 +14,7 @@
     <p:sldId id="265" r:id="rId8"/>
     <p:sldId id="264" r:id="rId9"/>
     <p:sldId id="258" r:id="rId10"/>
+    <p:sldId id="266" r:id="rId11"/>
   </p:sldIdLst>
   <p:sldSz cx="9144000" cy="6858000" type="screen4x3"/>
   <p:notesSz cx="6858000" cy="9144000"/>
@@ -296,7 +297,7 @@
           <a:p>
             <a:fld id="{E90ED720-0104-4369-84BC-D37694168613}" type="datetimeFigureOut">
               <a:rPr kumimoji="1" lang="ja-JP" altLang="en-US" smtClean="0"/>
-              <a:t>16/08/22</a:t>
+              <a:t>2016/8/23</a:t>
             </a:fld>
             <a:endParaRPr kumimoji="1" lang="ja-JP" altLang="en-US"/>
           </a:p>
@@ -493,7 +494,7 @@
           <a:p>
             <a:fld id="{E90ED720-0104-4369-84BC-D37694168613}" type="datetimeFigureOut">
               <a:rPr kumimoji="1" lang="ja-JP" altLang="en-US" smtClean="0"/>
-              <a:t>16/08/22</a:t>
+              <a:t>2016/8/23</a:t>
             </a:fld>
             <a:endParaRPr kumimoji="1" lang="ja-JP" altLang="en-US"/>
           </a:p>
@@ -700,7 +701,7 @@
           <a:p>
             <a:fld id="{E90ED720-0104-4369-84BC-D37694168613}" type="datetimeFigureOut">
               <a:rPr kumimoji="1" lang="ja-JP" altLang="en-US" smtClean="0"/>
-              <a:t>16/08/22</a:t>
+              <a:t>2016/8/23</a:t>
             </a:fld>
             <a:endParaRPr kumimoji="1" lang="ja-JP" altLang="en-US"/>
           </a:p>
@@ -897,7 +898,7 @@
           <a:p>
             <a:fld id="{E90ED720-0104-4369-84BC-D37694168613}" type="datetimeFigureOut">
               <a:rPr kumimoji="1" lang="ja-JP" altLang="en-US" smtClean="0"/>
-              <a:t>16/08/22</a:t>
+              <a:t>2016/8/23</a:t>
             </a:fld>
             <a:endParaRPr kumimoji="1" lang="ja-JP" altLang="en-US"/>
           </a:p>
@@ -1138,7 +1139,7 @@
           <a:p>
             <a:fld id="{E90ED720-0104-4369-84BC-D37694168613}" type="datetimeFigureOut">
               <a:rPr kumimoji="1" lang="ja-JP" altLang="en-US" smtClean="0"/>
-              <a:t>16/08/22</a:t>
+              <a:t>2016/8/23</a:t>
             </a:fld>
             <a:endParaRPr kumimoji="1" lang="ja-JP" altLang="en-US"/>
           </a:p>
@@ -1485,7 +1486,7 @@
           <a:p>
             <a:fld id="{E90ED720-0104-4369-84BC-D37694168613}" type="datetimeFigureOut">
               <a:rPr kumimoji="1" lang="ja-JP" altLang="en-US" smtClean="0"/>
-              <a:t>16/08/22</a:t>
+              <a:t>2016/8/23</a:t>
             </a:fld>
             <a:endParaRPr kumimoji="1" lang="ja-JP" altLang="en-US"/>
           </a:p>
@@ -1966,7 +1967,7 @@
           <a:p>
             <a:fld id="{E90ED720-0104-4369-84BC-D37694168613}" type="datetimeFigureOut">
               <a:rPr kumimoji="1" lang="ja-JP" altLang="en-US" smtClean="0"/>
-              <a:t>16/08/22</a:t>
+              <a:t>2016/8/23</a:t>
             </a:fld>
             <a:endParaRPr kumimoji="1" lang="ja-JP" altLang="en-US"/>
           </a:p>
@@ -2079,7 +2080,7 @@
           <a:p>
             <a:fld id="{E90ED720-0104-4369-84BC-D37694168613}" type="datetimeFigureOut">
               <a:rPr kumimoji="1" lang="ja-JP" altLang="en-US" smtClean="0"/>
-              <a:t>16/08/22</a:t>
+              <a:t>2016/8/23</a:t>
             </a:fld>
             <a:endParaRPr kumimoji="1" lang="ja-JP" altLang="en-US"/>
           </a:p>
@@ -2169,7 +2170,7 @@
           <a:p>
             <a:fld id="{E90ED720-0104-4369-84BC-D37694168613}" type="datetimeFigureOut">
               <a:rPr kumimoji="1" lang="ja-JP" altLang="en-US" smtClean="0"/>
-              <a:t>16/08/22</a:t>
+              <a:t>2016/8/23</a:t>
             </a:fld>
             <a:endParaRPr kumimoji="1" lang="ja-JP" altLang="en-US"/>
           </a:p>
@@ -2473,7 +2474,7 @@
           <a:p>
             <a:fld id="{E90ED720-0104-4369-84BC-D37694168613}" type="datetimeFigureOut">
               <a:rPr kumimoji="1" lang="ja-JP" altLang="en-US" smtClean="0"/>
-              <a:t>16/08/22</a:t>
+              <a:t>2016/8/23</a:t>
             </a:fld>
             <a:endParaRPr kumimoji="1" lang="ja-JP" altLang="en-US"/>
           </a:p>
@@ -2721,7 +2722,7 @@
           <a:p>
             <a:fld id="{E90ED720-0104-4369-84BC-D37694168613}" type="datetimeFigureOut">
               <a:rPr kumimoji="1" lang="ja-JP" altLang="en-US" smtClean="0"/>
-              <a:t>16/08/22</a:t>
+              <a:t>2016/8/23</a:t>
             </a:fld>
             <a:endParaRPr kumimoji="1" lang="ja-JP" altLang="en-US"/>
           </a:p>
@@ -2961,7 +2962,7 @@
           <a:p>
             <a:fld id="{E90ED720-0104-4369-84BC-D37694168613}" type="datetimeFigureOut">
               <a:rPr kumimoji="1" lang="ja-JP" altLang="en-US" smtClean="0"/>
-              <a:t>16/08/22</a:t>
+              <a:t>2016/8/23</a:t>
             </a:fld>
             <a:endParaRPr kumimoji="1" lang="ja-JP" altLang="en-US"/>
           </a:p>
@@ -4233,18 +4234,7 @@
                   </a:schemeClr>
                 </a:solidFill>
               </a:rPr>
-              <a:t>learning-</a:t>
-            </a:r>
-            <a:r>
-              <a:rPr lang="en-US" altLang="ja-JP" sz="1050" dirty="0" smtClean="0">
-                <a:solidFill>
-                  <a:schemeClr val="tx1">
-                    <a:lumMod val="75000"/>
-                    <a:lumOff val="25000"/>
-                  </a:schemeClr>
-                </a:solidFill>
-              </a:rPr>
-              <a:t>to-rank</a:t>
+              <a:t>learning-to-rank</a:t>
             </a:r>
           </a:p>
           <a:p>
@@ -5432,7 +5422,2818 @@
   <p:timing>
     <p:tnLst>
       <p:par>
-        <p:cTn xmlns:p14="http://schemas.microsoft.com/office/powerpoint/2010/main" id="1" dur="indefinite" restart="never" nodeType="tmRoot"/>
+        <p:cTn id="1" dur="indefinite" restart="never" nodeType="tmRoot"/>
+      </p:par>
+    </p:tnLst>
+  </p:timing>
+</p:sld>
+</file>
+
+<file path=ppt/slides/slide10.xml><?xml version="1.0" encoding="utf-8"?>
+<p:sld xmlns:a="http://schemas.openxmlformats.org/drawingml/2006/main" xmlns:r="http://schemas.openxmlformats.org/officeDocument/2006/relationships" xmlns:p="http://schemas.openxmlformats.org/presentationml/2006/main">
+  <p:cSld>
+    <p:spTree>
+      <p:nvGrpSpPr>
+        <p:cNvPr id="1" name=""/>
+        <p:cNvGrpSpPr/>
+        <p:nvPr/>
+      </p:nvGrpSpPr>
+      <p:grpSpPr>
+        <a:xfrm>
+          <a:off x="0" y="0"/>
+          <a:ext cx="0" cy="0"/>
+          <a:chOff x="0" y="0"/>
+          <a:chExt cx="0" cy="0"/>
+        </a:xfrm>
+      </p:grpSpPr>
+      <p:sp>
+        <p:nvSpPr>
+          <p:cNvPr id="2" name="タイトル 1"/>
+          <p:cNvSpPr>
+            <a:spLocks noGrp="1"/>
+          </p:cNvSpPr>
+          <p:nvPr>
+            <p:ph type="title"/>
+          </p:nvPr>
+        </p:nvSpPr>
+        <p:spPr/>
+        <p:txBody>
+          <a:bodyPr>
+            <a:normAutofit fontScale="90000"/>
+          </a:bodyPr>
+          <a:lstStyle/>
+          <a:p>
+            <a:r>
+              <a:rPr kumimoji="1" lang="en-US" altLang="ja-JP" dirty="0" smtClean="0"/>
+              <a:t>Example: Named Entity Recognition</a:t>
+            </a:r>
+            <a:endParaRPr kumimoji="1" lang="ja-JP" altLang="en-US" dirty="0"/>
+          </a:p>
+        </p:txBody>
+      </p:sp>
+      <p:sp>
+        <p:nvSpPr>
+          <p:cNvPr id="13" name="正方形/長方形 12"/>
+          <p:cNvSpPr/>
+          <p:nvPr/>
+        </p:nvSpPr>
+        <p:spPr>
+          <a:xfrm>
+            <a:off x="611560" y="3082958"/>
+            <a:ext cx="576064" cy="291684"/>
+          </a:xfrm>
+          <a:prstGeom prst="rect">
+            <a:avLst/>
+          </a:prstGeom>
+          <a:solidFill>
+            <a:schemeClr val="bg2"/>
+          </a:solidFill>
+          <a:ln w="12700">
+            <a:solidFill>
+              <a:schemeClr val="tx1">
+                <a:lumMod val="75000"/>
+                <a:lumOff val="25000"/>
+              </a:schemeClr>
+            </a:solidFill>
+          </a:ln>
+        </p:spPr>
+        <p:style>
+          <a:lnRef idx="2">
+            <a:schemeClr val="accent1">
+              <a:shade val="50000"/>
+            </a:schemeClr>
+          </a:lnRef>
+          <a:fillRef idx="1">
+            <a:schemeClr val="accent1"/>
+          </a:fillRef>
+          <a:effectRef idx="0">
+            <a:schemeClr val="accent1"/>
+          </a:effectRef>
+          <a:fontRef idx="minor">
+            <a:schemeClr val="lt1"/>
+          </a:fontRef>
+        </p:style>
+        <p:txBody>
+          <a:bodyPr rtlCol="0" anchor="ctr"/>
+          <a:lstStyle/>
+          <a:p>
+            <a:pPr algn="ctr"/>
+            <a:r>
+              <a:rPr lang="en-US" altLang="ja-JP" sz="1050" dirty="0" smtClean="0">
+                <a:solidFill>
+                  <a:schemeClr val="tx1">
+                    <a:lumMod val="75000"/>
+                    <a:lumOff val="25000"/>
+                  </a:schemeClr>
+                </a:solidFill>
+              </a:rPr>
+              <a:t>Doc </a:t>
+            </a:r>
+            <a:r>
+              <a:rPr kumimoji="1" lang="en-US" altLang="ja-JP" sz="1050" dirty="0" smtClean="0">
+                <a:solidFill>
+                  <a:schemeClr val="tx1">
+                    <a:lumMod val="75000"/>
+                    <a:lumOff val="25000"/>
+                  </a:schemeClr>
+                </a:solidFill>
+              </a:rPr>
+              <a:t>ID</a:t>
+            </a:r>
+            <a:endParaRPr kumimoji="1" lang="ja-JP" altLang="en-US" sz="1050" dirty="0" smtClean="0">
+              <a:solidFill>
+                <a:schemeClr val="tx1">
+                  <a:lumMod val="75000"/>
+                  <a:lumOff val="25000"/>
+                </a:schemeClr>
+              </a:solidFill>
+            </a:endParaRPr>
+          </a:p>
+        </p:txBody>
+      </p:sp>
+      <p:sp>
+        <p:nvSpPr>
+          <p:cNvPr id="14" name="正方形/長方形 13"/>
+          <p:cNvSpPr/>
+          <p:nvPr/>
+        </p:nvSpPr>
+        <p:spPr>
+          <a:xfrm>
+            <a:off x="1175374" y="3082958"/>
+            <a:ext cx="2156786" cy="291684"/>
+          </a:xfrm>
+          <a:prstGeom prst="rect">
+            <a:avLst/>
+          </a:prstGeom>
+          <a:solidFill>
+            <a:schemeClr val="bg2"/>
+          </a:solidFill>
+          <a:ln w="12700">
+            <a:solidFill>
+              <a:schemeClr val="tx1">
+                <a:lumMod val="75000"/>
+                <a:lumOff val="25000"/>
+              </a:schemeClr>
+            </a:solidFill>
+          </a:ln>
+        </p:spPr>
+        <p:style>
+          <a:lnRef idx="2">
+            <a:schemeClr val="accent1">
+              <a:shade val="50000"/>
+            </a:schemeClr>
+          </a:lnRef>
+          <a:fillRef idx="1">
+            <a:schemeClr val="accent1"/>
+          </a:fillRef>
+          <a:effectRef idx="0">
+            <a:schemeClr val="accent1"/>
+          </a:effectRef>
+          <a:fontRef idx="minor">
+            <a:schemeClr val="lt1"/>
+          </a:fontRef>
+        </p:style>
+        <p:txBody>
+          <a:bodyPr rtlCol="0" anchor="ctr"/>
+          <a:lstStyle/>
+          <a:p>
+            <a:pPr algn="ctr"/>
+            <a:r>
+              <a:rPr kumimoji="1" lang="en-US" altLang="ja-JP" sz="1050" dirty="0" smtClean="0">
+                <a:solidFill>
+                  <a:schemeClr val="tx1">
+                    <a:lumMod val="75000"/>
+                    <a:lumOff val="25000"/>
+                  </a:schemeClr>
+                </a:solidFill>
+              </a:rPr>
+              <a:t>body</a:t>
+            </a:r>
+            <a:endParaRPr kumimoji="1" lang="ja-JP" altLang="en-US" sz="1050" dirty="0" smtClean="0">
+              <a:solidFill>
+                <a:schemeClr val="tx1">
+                  <a:lumMod val="75000"/>
+                  <a:lumOff val="25000"/>
+                </a:schemeClr>
+              </a:solidFill>
+            </a:endParaRPr>
+          </a:p>
+        </p:txBody>
+      </p:sp>
+      <p:sp>
+        <p:nvSpPr>
+          <p:cNvPr id="15" name="正方形/長方形 14"/>
+          <p:cNvSpPr/>
+          <p:nvPr/>
+        </p:nvSpPr>
+        <p:spPr>
+          <a:xfrm>
+            <a:off x="615014" y="3349688"/>
+            <a:ext cx="576064" cy="291684"/>
+          </a:xfrm>
+          <a:prstGeom prst="rect">
+            <a:avLst/>
+          </a:prstGeom>
+          <a:solidFill>
+            <a:schemeClr val="bg1"/>
+          </a:solidFill>
+          <a:ln w="12700">
+            <a:solidFill>
+              <a:schemeClr val="tx1">
+                <a:lumMod val="75000"/>
+                <a:lumOff val="25000"/>
+              </a:schemeClr>
+            </a:solidFill>
+          </a:ln>
+        </p:spPr>
+        <p:style>
+          <a:lnRef idx="2">
+            <a:schemeClr val="accent1">
+              <a:shade val="50000"/>
+            </a:schemeClr>
+          </a:lnRef>
+          <a:fillRef idx="1">
+            <a:schemeClr val="accent1"/>
+          </a:fillRef>
+          <a:effectRef idx="0">
+            <a:schemeClr val="accent1"/>
+          </a:effectRef>
+          <a:fontRef idx="minor">
+            <a:schemeClr val="lt1"/>
+          </a:fontRef>
+        </p:style>
+        <p:txBody>
+          <a:bodyPr rtlCol="0" anchor="ctr"/>
+          <a:lstStyle/>
+          <a:p>
+            <a:pPr algn="ctr"/>
+            <a:r>
+              <a:rPr lang="en-US" altLang="ja-JP" sz="1050" dirty="0" smtClean="0">
+                <a:solidFill>
+                  <a:schemeClr val="tx1">
+                    <a:lumMod val="75000"/>
+                    <a:lumOff val="25000"/>
+                  </a:schemeClr>
+                </a:solidFill>
+              </a:rPr>
+              <a:t>#001</a:t>
+            </a:r>
+            <a:endParaRPr kumimoji="1" lang="ja-JP" altLang="en-US" sz="1050" dirty="0" smtClean="0">
+              <a:solidFill>
+                <a:schemeClr val="tx1">
+                  <a:lumMod val="75000"/>
+                  <a:lumOff val="25000"/>
+                </a:schemeClr>
+              </a:solidFill>
+            </a:endParaRPr>
+          </a:p>
+        </p:txBody>
+      </p:sp>
+      <p:sp>
+        <p:nvSpPr>
+          <p:cNvPr id="16" name="正方形/長方形 15"/>
+          <p:cNvSpPr/>
+          <p:nvPr/>
+        </p:nvSpPr>
+        <p:spPr>
+          <a:xfrm>
+            <a:off x="1178828" y="3349688"/>
+            <a:ext cx="2156786" cy="291684"/>
+          </a:xfrm>
+          <a:prstGeom prst="rect">
+            <a:avLst/>
+          </a:prstGeom>
+          <a:solidFill>
+            <a:schemeClr val="bg1"/>
+          </a:solidFill>
+          <a:ln w="12700">
+            <a:solidFill>
+              <a:schemeClr val="tx1">
+                <a:lumMod val="75000"/>
+                <a:lumOff val="25000"/>
+              </a:schemeClr>
+            </a:solidFill>
+          </a:ln>
+        </p:spPr>
+        <p:style>
+          <a:lnRef idx="2">
+            <a:schemeClr val="accent1">
+              <a:shade val="50000"/>
+            </a:schemeClr>
+          </a:lnRef>
+          <a:fillRef idx="1">
+            <a:schemeClr val="accent1"/>
+          </a:fillRef>
+          <a:effectRef idx="0">
+            <a:schemeClr val="accent1"/>
+          </a:effectRef>
+          <a:fontRef idx="minor">
+            <a:schemeClr val="lt1"/>
+          </a:fontRef>
+        </p:style>
+        <p:txBody>
+          <a:bodyPr rtlCol="0" anchor="ctr"/>
+          <a:lstStyle/>
+          <a:p>
+            <a:r>
+              <a:rPr lang="en-US" altLang="ja-JP" sz="1050" dirty="0" smtClean="0">
+                <a:solidFill>
+                  <a:schemeClr val="tx1">
+                    <a:lumMod val="75000"/>
+                    <a:lumOff val="25000"/>
+                  </a:schemeClr>
+                </a:solidFill>
+              </a:rPr>
+              <a:t>Mark and John go to </a:t>
+            </a:r>
+            <a:r>
+              <a:rPr lang="en-US" altLang="ja-JP" sz="1050" dirty="0">
+                <a:solidFill>
+                  <a:schemeClr val="tx1">
+                    <a:lumMod val="75000"/>
+                    <a:lumOff val="25000"/>
+                  </a:schemeClr>
+                </a:solidFill>
+              </a:rPr>
+              <a:t>H</a:t>
+            </a:r>
+            <a:r>
+              <a:rPr lang="en-US" altLang="ja-JP" sz="1050" dirty="0" smtClean="0">
+                <a:solidFill>
+                  <a:schemeClr val="tx1">
+                    <a:lumMod val="75000"/>
+                    <a:lumOff val="25000"/>
+                  </a:schemeClr>
+                </a:solidFill>
+              </a:rPr>
+              <a:t>awaii …</a:t>
+            </a:r>
+            <a:endParaRPr kumimoji="1" lang="ja-JP" altLang="en-US" sz="1050" dirty="0" smtClean="0">
+              <a:solidFill>
+                <a:schemeClr val="tx1">
+                  <a:lumMod val="75000"/>
+                  <a:lumOff val="25000"/>
+                </a:schemeClr>
+              </a:solidFill>
+            </a:endParaRPr>
+          </a:p>
+        </p:txBody>
+      </p:sp>
+      <p:sp>
+        <p:nvSpPr>
+          <p:cNvPr id="17" name="正方形/長方形 16"/>
+          <p:cNvSpPr/>
+          <p:nvPr/>
+        </p:nvSpPr>
+        <p:spPr>
+          <a:xfrm>
+            <a:off x="615014" y="3641372"/>
+            <a:ext cx="576064" cy="291684"/>
+          </a:xfrm>
+          <a:prstGeom prst="rect">
+            <a:avLst/>
+          </a:prstGeom>
+          <a:solidFill>
+            <a:schemeClr val="bg1"/>
+          </a:solidFill>
+          <a:ln w="12700">
+            <a:solidFill>
+              <a:schemeClr val="tx1">
+                <a:lumMod val="75000"/>
+                <a:lumOff val="25000"/>
+              </a:schemeClr>
+            </a:solidFill>
+          </a:ln>
+        </p:spPr>
+        <p:style>
+          <a:lnRef idx="2">
+            <a:schemeClr val="accent1">
+              <a:shade val="50000"/>
+            </a:schemeClr>
+          </a:lnRef>
+          <a:fillRef idx="1">
+            <a:schemeClr val="accent1"/>
+          </a:fillRef>
+          <a:effectRef idx="0">
+            <a:schemeClr val="accent1"/>
+          </a:effectRef>
+          <a:fontRef idx="minor">
+            <a:schemeClr val="lt1"/>
+          </a:fontRef>
+        </p:style>
+        <p:txBody>
+          <a:bodyPr rtlCol="0" anchor="ctr"/>
+          <a:lstStyle/>
+          <a:p>
+            <a:pPr algn="ctr"/>
+            <a:r>
+              <a:rPr lang="en-US" altLang="ja-JP" sz="1050" dirty="0" smtClean="0">
+                <a:solidFill>
+                  <a:schemeClr val="tx1">
+                    <a:lumMod val="75000"/>
+                    <a:lumOff val="25000"/>
+                  </a:schemeClr>
+                </a:solidFill>
+              </a:rPr>
+              <a:t>#002</a:t>
+            </a:r>
+            <a:endParaRPr kumimoji="1" lang="ja-JP" altLang="en-US" sz="1050" dirty="0" smtClean="0">
+              <a:solidFill>
+                <a:schemeClr val="tx1">
+                  <a:lumMod val="75000"/>
+                  <a:lumOff val="25000"/>
+                </a:schemeClr>
+              </a:solidFill>
+            </a:endParaRPr>
+          </a:p>
+        </p:txBody>
+      </p:sp>
+      <p:sp>
+        <p:nvSpPr>
+          <p:cNvPr id="18" name="正方形/長方形 17"/>
+          <p:cNvSpPr/>
+          <p:nvPr/>
+        </p:nvSpPr>
+        <p:spPr>
+          <a:xfrm>
+            <a:off x="1178828" y="3641372"/>
+            <a:ext cx="2156786" cy="291684"/>
+          </a:xfrm>
+          <a:prstGeom prst="rect">
+            <a:avLst/>
+          </a:prstGeom>
+          <a:solidFill>
+            <a:schemeClr val="bg1"/>
+          </a:solidFill>
+          <a:ln w="12700">
+            <a:solidFill>
+              <a:schemeClr val="tx1">
+                <a:lumMod val="75000"/>
+                <a:lumOff val="25000"/>
+              </a:schemeClr>
+            </a:solidFill>
+          </a:ln>
+        </p:spPr>
+        <p:style>
+          <a:lnRef idx="2">
+            <a:schemeClr val="accent1">
+              <a:shade val="50000"/>
+            </a:schemeClr>
+          </a:lnRef>
+          <a:fillRef idx="1">
+            <a:schemeClr val="accent1"/>
+          </a:fillRef>
+          <a:effectRef idx="0">
+            <a:schemeClr val="accent1"/>
+          </a:effectRef>
+          <a:fontRef idx="minor">
+            <a:schemeClr val="lt1"/>
+          </a:fontRef>
+        </p:style>
+        <p:txBody>
+          <a:bodyPr rtlCol="0" anchor="ctr"/>
+          <a:lstStyle/>
+          <a:p>
+            <a:r>
+              <a:rPr lang="en-US" altLang="ja-JP" sz="1050" dirty="0" smtClean="0">
+                <a:solidFill>
+                  <a:schemeClr val="tx1">
+                    <a:lumMod val="75000"/>
+                    <a:lumOff val="25000"/>
+                  </a:schemeClr>
+                </a:solidFill>
+              </a:rPr>
+              <a:t>Chris  is planning…. at New York …</a:t>
+            </a:r>
+            <a:endParaRPr kumimoji="1" lang="ja-JP" altLang="en-US" sz="1050" dirty="0" smtClean="0">
+              <a:solidFill>
+                <a:schemeClr val="tx1">
+                  <a:lumMod val="75000"/>
+                  <a:lumOff val="25000"/>
+                </a:schemeClr>
+              </a:solidFill>
+            </a:endParaRPr>
+          </a:p>
+        </p:txBody>
+      </p:sp>
+      <p:sp>
+        <p:nvSpPr>
+          <p:cNvPr id="19" name="正方形/長方形 18"/>
+          <p:cNvSpPr/>
+          <p:nvPr/>
+        </p:nvSpPr>
+        <p:spPr>
+          <a:xfrm>
+            <a:off x="1046701" y="4387526"/>
+            <a:ext cx="1725099" cy="625650"/>
+          </a:xfrm>
+          <a:prstGeom prst="rect">
+            <a:avLst/>
+          </a:prstGeom>
+          <a:solidFill>
+            <a:schemeClr val="bg2"/>
+          </a:solidFill>
+          <a:ln>
+            <a:solidFill>
+              <a:schemeClr val="tx1">
+                <a:lumMod val="75000"/>
+                <a:lumOff val="25000"/>
+              </a:schemeClr>
+            </a:solidFill>
+          </a:ln>
+        </p:spPr>
+        <p:style>
+          <a:lnRef idx="2">
+            <a:schemeClr val="accent1">
+              <a:shade val="50000"/>
+            </a:schemeClr>
+          </a:lnRef>
+          <a:fillRef idx="1">
+            <a:schemeClr val="accent1"/>
+          </a:fillRef>
+          <a:effectRef idx="0">
+            <a:schemeClr val="accent1"/>
+          </a:effectRef>
+          <a:fontRef idx="minor">
+            <a:schemeClr val="lt1"/>
+          </a:fontRef>
+        </p:style>
+        <p:txBody>
+          <a:bodyPr rot="0" spcFirstLastPara="0" vertOverflow="overflow" horzOverflow="overflow" vert="horz" wrap="square" lIns="91440" tIns="45720" rIns="91440" bIns="45720" numCol="1" spcCol="0" rtlCol="0" fromWordArt="0" anchor="ctr" anchorCtr="0" forceAA="0" compatLnSpc="1">
+            <a:prstTxWarp prst="textNoShape">
+              <a:avLst/>
+            </a:prstTxWarp>
+            <a:noAutofit/>
+          </a:bodyPr>
+          <a:lstStyle/>
+          <a:p>
+            <a:pPr algn="ctr"/>
+            <a:r>
+              <a:rPr lang="en-US" altLang="ja-JP" sz="1200" b="1" dirty="0" err="1" smtClean="0">
+                <a:solidFill>
+                  <a:schemeClr val="tx1">
+                    <a:lumMod val="75000"/>
+                    <a:lumOff val="25000"/>
+                  </a:schemeClr>
+                </a:solidFill>
+              </a:rPr>
+              <a:t>OpenNLPNer</a:t>
+            </a:r>
+            <a:endParaRPr lang="en-US" altLang="ja-JP" sz="1200" b="1" dirty="0" smtClean="0">
+              <a:solidFill>
+                <a:schemeClr val="tx1">
+                  <a:lumMod val="75000"/>
+                  <a:lumOff val="25000"/>
+                </a:schemeClr>
+              </a:solidFill>
+            </a:endParaRPr>
+          </a:p>
+          <a:p>
+            <a:pPr algn="ctr"/>
+            <a:r>
+              <a:rPr lang="en-US" altLang="ja-JP" sz="1200" b="1" dirty="0" smtClean="0">
+                <a:solidFill>
+                  <a:schemeClr val="tx1">
+                    <a:lumMod val="75000"/>
+                    <a:lumOff val="25000"/>
+                  </a:schemeClr>
+                </a:solidFill>
+              </a:rPr>
+              <a:t>Processor</a:t>
+            </a:r>
+          </a:p>
+          <a:p>
+            <a:pPr algn="ctr"/>
+            <a:r>
+              <a:rPr lang="ja-JP" altLang="en-US" sz="1200" b="1" dirty="0" smtClean="0">
+                <a:solidFill>
+                  <a:schemeClr val="tx1">
+                    <a:lumMod val="75000"/>
+                    <a:lumOff val="25000"/>
+                  </a:schemeClr>
+                </a:solidFill>
+              </a:rPr>
+              <a:t>（</a:t>
+            </a:r>
+            <a:r>
+              <a:rPr lang="en-US" altLang="ja-JP" sz="1200" b="1" dirty="0" smtClean="0">
+                <a:solidFill>
+                  <a:schemeClr val="tx1">
+                    <a:lumMod val="75000"/>
+                    <a:lumOff val="25000"/>
+                  </a:schemeClr>
+                </a:solidFill>
+              </a:rPr>
+              <a:t>NLP4L</a:t>
+            </a:r>
+            <a:r>
+              <a:rPr lang="ja-JP" altLang="en-US" sz="1200" b="1" dirty="0" smtClean="0">
+                <a:solidFill>
+                  <a:schemeClr val="tx1">
+                    <a:lumMod val="75000"/>
+                    <a:lumOff val="25000"/>
+                  </a:schemeClr>
+                </a:solidFill>
+              </a:rPr>
+              <a:t>）</a:t>
+            </a:r>
+            <a:endParaRPr lang="en-US" altLang="ja-JP" sz="1200" b="1" dirty="0">
+              <a:solidFill>
+                <a:schemeClr val="tx1">
+                  <a:lumMod val="75000"/>
+                  <a:lumOff val="25000"/>
+                </a:schemeClr>
+              </a:solidFill>
+            </a:endParaRPr>
+          </a:p>
+        </p:txBody>
+      </p:sp>
+      <p:sp>
+        <p:nvSpPr>
+          <p:cNvPr id="20" name="角丸四角形 19"/>
+          <p:cNvSpPr/>
+          <p:nvPr/>
+        </p:nvSpPr>
+        <p:spPr>
+          <a:xfrm>
+            <a:off x="3551638" y="4365104"/>
+            <a:ext cx="1596425" cy="404884"/>
+          </a:xfrm>
+          <a:prstGeom prst="roundRect">
+            <a:avLst/>
+          </a:prstGeom>
+          <a:solidFill>
+            <a:schemeClr val="bg2"/>
+          </a:solidFill>
+          <a:ln>
+            <a:solidFill>
+              <a:schemeClr val="tx1">
+                <a:lumMod val="75000"/>
+                <a:lumOff val="25000"/>
+              </a:schemeClr>
+            </a:solidFill>
+          </a:ln>
+        </p:spPr>
+        <p:style>
+          <a:lnRef idx="2">
+            <a:schemeClr val="accent1">
+              <a:shade val="50000"/>
+            </a:schemeClr>
+          </a:lnRef>
+          <a:fillRef idx="1">
+            <a:schemeClr val="accent1"/>
+          </a:fillRef>
+          <a:effectRef idx="0">
+            <a:schemeClr val="accent1"/>
+          </a:effectRef>
+          <a:fontRef idx="minor">
+            <a:schemeClr val="lt1"/>
+          </a:fontRef>
+        </p:style>
+        <p:txBody>
+          <a:bodyPr rtlCol="0" anchor="ctr"/>
+          <a:lstStyle/>
+          <a:p>
+            <a:pPr algn="ctr"/>
+            <a:r>
+              <a:rPr lang="en-US" altLang="ja-JP" sz="1200" dirty="0" smtClean="0">
+                <a:solidFill>
+                  <a:schemeClr val="tx1">
+                    <a:lumMod val="75000"/>
+                    <a:lumOff val="25000"/>
+                  </a:schemeClr>
+                </a:solidFill>
+              </a:rPr>
+              <a:t>Person Name Finder</a:t>
+            </a:r>
+            <a:endParaRPr kumimoji="1" lang="en-US" altLang="ja-JP" sz="1200" dirty="0" smtClean="0">
+              <a:solidFill>
+                <a:schemeClr val="tx1">
+                  <a:lumMod val="75000"/>
+                  <a:lumOff val="25000"/>
+                </a:schemeClr>
+              </a:solidFill>
+            </a:endParaRPr>
+          </a:p>
+          <a:p>
+            <a:pPr algn="ctr"/>
+            <a:r>
+              <a:rPr lang="en-US" altLang="ja-JP" sz="1200" dirty="0" smtClean="0">
+                <a:solidFill>
+                  <a:schemeClr val="tx1">
+                    <a:lumMod val="75000"/>
+                    <a:lumOff val="25000"/>
+                  </a:schemeClr>
+                </a:solidFill>
+              </a:rPr>
+              <a:t>(</a:t>
+            </a:r>
+            <a:r>
+              <a:rPr lang="en-US" altLang="ja-JP" sz="1200" dirty="0" err="1" smtClean="0">
+                <a:solidFill>
+                  <a:schemeClr val="tx1">
+                    <a:lumMod val="75000"/>
+                    <a:lumOff val="25000"/>
+                  </a:schemeClr>
+                </a:solidFill>
+              </a:rPr>
+              <a:t>OpenNLP</a:t>
+            </a:r>
+            <a:r>
+              <a:rPr lang="en-US" altLang="ja-JP" sz="1200" dirty="0" smtClean="0">
+                <a:solidFill>
+                  <a:schemeClr val="tx1">
+                    <a:lumMod val="75000"/>
+                    <a:lumOff val="25000"/>
+                  </a:schemeClr>
+                </a:solidFill>
+              </a:rPr>
+              <a:t>)</a:t>
+            </a:r>
+            <a:endParaRPr kumimoji="1" lang="ja-JP" altLang="en-US" sz="1200" dirty="0" smtClean="0">
+              <a:solidFill>
+                <a:schemeClr val="tx1">
+                  <a:lumMod val="75000"/>
+                  <a:lumOff val="25000"/>
+                </a:schemeClr>
+              </a:solidFill>
+            </a:endParaRPr>
+          </a:p>
+        </p:txBody>
+      </p:sp>
+      <p:cxnSp>
+        <p:nvCxnSpPr>
+          <p:cNvPr id="21" name="カギ線コネクタ 20"/>
+          <p:cNvCxnSpPr>
+            <a:stCxn id="19" idx="3"/>
+            <a:endCxn id="20" idx="1"/>
+          </p:cNvCxnSpPr>
+          <p:nvPr/>
+        </p:nvCxnSpPr>
+        <p:spPr>
+          <a:xfrm flipV="1">
+            <a:off x="2771800" y="4567546"/>
+            <a:ext cx="779838" cy="132805"/>
+          </a:xfrm>
+          <a:prstGeom prst="bentConnector3">
+            <a:avLst>
+              <a:gd name="adj1" fmla="val 50000"/>
+            </a:avLst>
+          </a:prstGeom>
+          <a:ln w="15875">
+            <a:solidFill>
+              <a:schemeClr val="tx1">
+                <a:lumMod val="75000"/>
+                <a:lumOff val="25000"/>
+              </a:schemeClr>
+            </a:solidFill>
+            <a:headEnd type="arrow"/>
+            <a:tailEnd type="none"/>
+          </a:ln>
+        </p:spPr>
+        <p:style>
+          <a:lnRef idx="1">
+            <a:schemeClr val="accent1"/>
+          </a:lnRef>
+          <a:fillRef idx="0">
+            <a:schemeClr val="accent1"/>
+          </a:fillRef>
+          <a:effectRef idx="0">
+            <a:schemeClr val="accent1"/>
+          </a:effectRef>
+          <a:fontRef idx="minor">
+            <a:schemeClr val="tx1"/>
+          </a:fontRef>
+        </p:style>
+      </p:cxnSp>
+      <p:sp>
+        <p:nvSpPr>
+          <p:cNvPr id="22" name="正方形/長方形 21"/>
+          <p:cNvSpPr/>
+          <p:nvPr/>
+        </p:nvSpPr>
+        <p:spPr>
+          <a:xfrm>
+            <a:off x="623810" y="5531230"/>
+            <a:ext cx="576064" cy="291684"/>
+          </a:xfrm>
+          <a:prstGeom prst="rect">
+            <a:avLst/>
+          </a:prstGeom>
+          <a:solidFill>
+            <a:schemeClr val="bg2"/>
+          </a:solidFill>
+          <a:ln w="12700">
+            <a:solidFill>
+              <a:schemeClr val="tx1">
+                <a:lumMod val="75000"/>
+                <a:lumOff val="25000"/>
+              </a:schemeClr>
+            </a:solidFill>
+          </a:ln>
+        </p:spPr>
+        <p:style>
+          <a:lnRef idx="2">
+            <a:schemeClr val="accent1">
+              <a:shade val="50000"/>
+            </a:schemeClr>
+          </a:lnRef>
+          <a:fillRef idx="1">
+            <a:schemeClr val="accent1"/>
+          </a:fillRef>
+          <a:effectRef idx="0">
+            <a:schemeClr val="accent1"/>
+          </a:effectRef>
+          <a:fontRef idx="minor">
+            <a:schemeClr val="lt1"/>
+          </a:fontRef>
+        </p:style>
+        <p:txBody>
+          <a:bodyPr rtlCol="0" anchor="ctr"/>
+          <a:lstStyle/>
+          <a:p>
+            <a:pPr algn="ctr"/>
+            <a:r>
+              <a:rPr lang="en-US" altLang="ja-JP" sz="1050" dirty="0" smtClean="0">
+                <a:solidFill>
+                  <a:schemeClr val="tx1">
+                    <a:lumMod val="75000"/>
+                    <a:lumOff val="25000"/>
+                  </a:schemeClr>
+                </a:solidFill>
+              </a:rPr>
+              <a:t>Doc </a:t>
+            </a:r>
+            <a:r>
+              <a:rPr kumimoji="1" lang="en-US" altLang="ja-JP" sz="1050" dirty="0" smtClean="0">
+                <a:solidFill>
+                  <a:schemeClr val="tx1">
+                    <a:lumMod val="75000"/>
+                    <a:lumOff val="25000"/>
+                  </a:schemeClr>
+                </a:solidFill>
+              </a:rPr>
+              <a:t>ID</a:t>
+            </a:r>
+            <a:endParaRPr kumimoji="1" lang="ja-JP" altLang="en-US" sz="1050" dirty="0" smtClean="0">
+              <a:solidFill>
+                <a:schemeClr val="tx1">
+                  <a:lumMod val="75000"/>
+                  <a:lumOff val="25000"/>
+                </a:schemeClr>
+              </a:solidFill>
+            </a:endParaRPr>
+          </a:p>
+        </p:txBody>
+      </p:sp>
+      <p:sp>
+        <p:nvSpPr>
+          <p:cNvPr id="23" name="正方形/長方形 22"/>
+          <p:cNvSpPr/>
+          <p:nvPr/>
+        </p:nvSpPr>
+        <p:spPr>
+          <a:xfrm>
+            <a:off x="1187624" y="5531230"/>
+            <a:ext cx="1081847" cy="291684"/>
+          </a:xfrm>
+          <a:prstGeom prst="rect">
+            <a:avLst/>
+          </a:prstGeom>
+          <a:solidFill>
+            <a:schemeClr val="bg2"/>
+          </a:solidFill>
+          <a:ln w="12700">
+            <a:solidFill>
+              <a:schemeClr val="tx1">
+                <a:lumMod val="75000"/>
+                <a:lumOff val="25000"/>
+              </a:schemeClr>
+            </a:solidFill>
+          </a:ln>
+        </p:spPr>
+        <p:style>
+          <a:lnRef idx="2">
+            <a:schemeClr val="accent1">
+              <a:shade val="50000"/>
+            </a:schemeClr>
+          </a:lnRef>
+          <a:fillRef idx="1">
+            <a:schemeClr val="accent1"/>
+          </a:fillRef>
+          <a:effectRef idx="0">
+            <a:schemeClr val="accent1"/>
+          </a:effectRef>
+          <a:fontRef idx="minor">
+            <a:schemeClr val="lt1"/>
+          </a:fontRef>
+        </p:style>
+        <p:txBody>
+          <a:bodyPr rtlCol="0" anchor="ctr"/>
+          <a:lstStyle/>
+          <a:p>
+            <a:pPr algn="ctr"/>
+            <a:r>
+              <a:rPr kumimoji="1" lang="en-US" altLang="ja-JP" sz="1050" dirty="0" err="1" smtClean="0">
+                <a:solidFill>
+                  <a:schemeClr val="tx1">
+                    <a:lumMod val="75000"/>
+                    <a:lumOff val="25000"/>
+                  </a:schemeClr>
+                </a:solidFill>
+              </a:rPr>
+              <a:t>body_person</a:t>
+            </a:r>
+            <a:endParaRPr kumimoji="1" lang="ja-JP" altLang="en-US" sz="1050" dirty="0" smtClean="0">
+              <a:solidFill>
+                <a:schemeClr val="tx1">
+                  <a:lumMod val="75000"/>
+                  <a:lumOff val="25000"/>
+                </a:schemeClr>
+              </a:solidFill>
+            </a:endParaRPr>
+          </a:p>
+        </p:txBody>
+      </p:sp>
+      <p:sp>
+        <p:nvSpPr>
+          <p:cNvPr id="24" name="正方形/長方形 23"/>
+          <p:cNvSpPr/>
+          <p:nvPr/>
+        </p:nvSpPr>
+        <p:spPr>
+          <a:xfrm>
+            <a:off x="627264" y="5797960"/>
+            <a:ext cx="576064" cy="291684"/>
+          </a:xfrm>
+          <a:prstGeom prst="rect">
+            <a:avLst/>
+          </a:prstGeom>
+          <a:solidFill>
+            <a:schemeClr val="bg1"/>
+          </a:solidFill>
+          <a:ln w="12700">
+            <a:solidFill>
+              <a:schemeClr val="tx1">
+                <a:lumMod val="75000"/>
+                <a:lumOff val="25000"/>
+              </a:schemeClr>
+            </a:solidFill>
+          </a:ln>
+        </p:spPr>
+        <p:style>
+          <a:lnRef idx="2">
+            <a:schemeClr val="accent1">
+              <a:shade val="50000"/>
+            </a:schemeClr>
+          </a:lnRef>
+          <a:fillRef idx="1">
+            <a:schemeClr val="accent1"/>
+          </a:fillRef>
+          <a:effectRef idx="0">
+            <a:schemeClr val="accent1"/>
+          </a:effectRef>
+          <a:fontRef idx="minor">
+            <a:schemeClr val="lt1"/>
+          </a:fontRef>
+        </p:style>
+        <p:txBody>
+          <a:bodyPr rtlCol="0" anchor="ctr"/>
+          <a:lstStyle/>
+          <a:p>
+            <a:pPr algn="ctr"/>
+            <a:r>
+              <a:rPr lang="en-US" altLang="ja-JP" sz="1050" dirty="0" smtClean="0">
+                <a:solidFill>
+                  <a:schemeClr val="tx1">
+                    <a:lumMod val="75000"/>
+                    <a:lumOff val="25000"/>
+                  </a:schemeClr>
+                </a:solidFill>
+              </a:rPr>
+              <a:t>#001</a:t>
+            </a:r>
+            <a:endParaRPr kumimoji="1" lang="ja-JP" altLang="en-US" sz="1050" dirty="0" smtClean="0">
+              <a:solidFill>
+                <a:schemeClr val="tx1">
+                  <a:lumMod val="75000"/>
+                  <a:lumOff val="25000"/>
+                </a:schemeClr>
+              </a:solidFill>
+            </a:endParaRPr>
+          </a:p>
+        </p:txBody>
+      </p:sp>
+      <p:sp>
+        <p:nvSpPr>
+          <p:cNvPr id="25" name="正方形/長方形 24"/>
+          <p:cNvSpPr/>
+          <p:nvPr/>
+        </p:nvSpPr>
+        <p:spPr>
+          <a:xfrm>
+            <a:off x="1191078" y="5797960"/>
+            <a:ext cx="1078393" cy="291684"/>
+          </a:xfrm>
+          <a:prstGeom prst="rect">
+            <a:avLst/>
+          </a:prstGeom>
+          <a:solidFill>
+            <a:schemeClr val="bg1"/>
+          </a:solidFill>
+          <a:ln w="12700">
+            <a:solidFill>
+              <a:schemeClr val="tx1">
+                <a:lumMod val="75000"/>
+                <a:lumOff val="25000"/>
+              </a:schemeClr>
+            </a:solidFill>
+          </a:ln>
+        </p:spPr>
+        <p:style>
+          <a:lnRef idx="2">
+            <a:schemeClr val="accent1">
+              <a:shade val="50000"/>
+            </a:schemeClr>
+          </a:lnRef>
+          <a:fillRef idx="1">
+            <a:schemeClr val="accent1"/>
+          </a:fillRef>
+          <a:effectRef idx="0">
+            <a:schemeClr val="accent1"/>
+          </a:effectRef>
+          <a:fontRef idx="minor">
+            <a:schemeClr val="lt1"/>
+          </a:fontRef>
+        </p:style>
+        <p:txBody>
+          <a:bodyPr rtlCol="0" anchor="ctr"/>
+          <a:lstStyle/>
+          <a:p>
+            <a:r>
+              <a:rPr lang="en-US" altLang="ja-JP" sz="1050" dirty="0" err="1" smtClean="0">
+                <a:solidFill>
+                  <a:schemeClr val="tx1">
+                    <a:lumMod val="75000"/>
+                    <a:lumOff val="25000"/>
+                  </a:schemeClr>
+                </a:solidFill>
+              </a:rPr>
+              <a:t>Mark,John</a:t>
+            </a:r>
+            <a:endParaRPr kumimoji="1" lang="ja-JP" altLang="en-US" sz="1050" dirty="0" smtClean="0">
+              <a:solidFill>
+                <a:schemeClr val="tx1">
+                  <a:lumMod val="75000"/>
+                  <a:lumOff val="25000"/>
+                </a:schemeClr>
+              </a:solidFill>
+            </a:endParaRPr>
+          </a:p>
+        </p:txBody>
+      </p:sp>
+      <p:sp>
+        <p:nvSpPr>
+          <p:cNvPr id="26" name="正方形/長方形 25"/>
+          <p:cNvSpPr/>
+          <p:nvPr/>
+        </p:nvSpPr>
+        <p:spPr>
+          <a:xfrm>
+            <a:off x="627264" y="6089644"/>
+            <a:ext cx="576064" cy="291684"/>
+          </a:xfrm>
+          <a:prstGeom prst="rect">
+            <a:avLst/>
+          </a:prstGeom>
+          <a:solidFill>
+            <a:schemeClr val="bg1"/>
+          </a:solidFill>
+          <a:ln w="12700">
+            <a:solidFill>
+              <a:schemeClr val="tx1">
+                <a:lumMod val="75000"/>
+                <a:lumOff val="25000"/>
+              </a:schemeClr>
+            </a:solidFill>
+          </a:ln>
+        </p:spPr>
+        <p:style>
+          <a:lnRef idx="2">
+            <a:schemeClr val="accent1">
+              <a:shade val="50000"/>
+            </a:schemeClr>
+          </a:lnRef>
+          <a:fillRef idx="1">
+            <a:schemeClr val="accent1"/>
+          </a:fillRef>
+          <a:effectRef idx="0">
+            <a:schemeClr val="accent1"/>
+          </a:effectRef>
+          <a:fontRef idx="minor">
+            <a:schemeClr val="lt1"/>
+          </a:fontRef>
+        </p:style>
+        <p:txBody>
+          <a:bodyPr rtlCol="0" anchor="ctr"/>
+          <a:lstStyle/>
+          <a:p>
+            <a:pPr algn="ctr"/>
+            <a:r>
+              <a:rPr lang="en-US" altLang="ja-JP" sz="1050" dirty="0" smtClean="0">
+                <a:solidFill>
+                  <a:schemeClr val="tx1">
+                    <a:lumMod val="75000"/>
+                    <a:lumOff val="25000"/>
+                  </a:schemeClr>
+                </a:solidFill>
+              </a:rPr>
+              <a:t>#002</a:t>
+            </a:r>
+            <a:endParaRPr kumimoji="1" lang="ja-JP" altLang="en-US" sz="1050" dirty="0" smtClean="0">
+              <a:solidFill>
+                <a:schemeClr val="tx1">
+                  <a:lumMod val="75000"/>
+                  <a:lumOff val="25000"/>
+                </a:schemeClr>
+              </a:solidFill>
+            </a:endParaRPr>
+          </a:p>
+        </p:txBody>
+      </p:sp>
+      <p:sp>
+        <p:nvSpPr>
+          <p:cNvPr id="27" name="正方形/長方形 26"/>
+          <p:cNvSpPr/>
+          <p:nvPr/>
+        </p:nvSpPr>
+        <p:spPr>
+          <a:xfrm>
+            <a:off x="1191078" y="6089644"/>
+            <a:ext cx="1078393" cy="291684"/>
+          </a:xfrm>
+          <a:prstGeom prst="rect">
+            <a:avLst/>
+          </a:prstGeom>
+          <a:solidFill>
+            <a:schemeClr val="bg1"/>
+          </a:solidFill>
+          <a:ln w="12700">
+            <a:solidFill>
+              <a:schemeClr val="tx1">
+                <a:lumMod val="75000"/>
+                <a:lumOff val="25000"/>
+              </a:schemeClr>
+            </a:solidFill>
+          </a:ln>
+        </p:spPr>
+        <p:style>
+          <a:lnRef idx="2">
+            <a:schemeClr val="accent1">
+              <a:shade val="50000"/>
+            </a:schemeClr>
+          </a:lnRef>
+          <a:fillRef idx="1">
+            <a:schemeClr val="accent1"/>
+          </a:fillRef>
+          <a:effectRef idx="0">
+            <a:schemeClr val="accent1"/>
+          </a:effectRef>
+          <a:fontRef idx="minor">
+            <a:schemeClr val="lt1"/>
+          </a:fontRef>
+        </p:style>
+        <p:txBody>
+          <a:bodyPr rtlCol="0" anchor="ctr"/>
+          <a:lstStyle/>
+          <a:p>
+            <a:r>
+              <a:rPr lang="en-US" altLang="ja-JP" sz="1050" dirty="0" smtClean="0">
+                <a:solidFill>
+                  <a:schemeClr val="tx1">
+                    <a:lumMod val="75000"/>
+                    <a:lumOff val="25000"/>
+                  </a:schemeClr>
+                </a:solidFill>
+              </a:rPr>
+              <a:t>Chris</a:t>
+            </a:r>
+            <a:endParaRPr kumimoji="1" lang="ja-JP" altLang="en-US" sz="1050" dirty="0" smtClean="0">
+              <a:solidFill>
+                <a:schemeClr val="tx1">
+                  <a:lumMod val="75000"/>
+                  <a:lumOff val="25000"/>
+                </a:schemeClr>
+              </a:solidFill>
+            </a:endParaRPr>
+          </a:p>
+        </p:txBody>
+      </p:sp>
+      <p:sp>
+        <p:nvSpPr>
+          <p:cNvPr id="28" name="角丸四角形 27"/>
+          <p:cNvSpPr/>
+          <p:nvPr/>
+        </p:nvSpPr>
+        <p:spPr>
+          <a:xfrm>
+            <a:off x="3551639" y="4804925"/>
+            <a:ext cx="1596424" cy="386383"/>
+          </a:xfrm>
+          <a:prstGeom prst="roundRect">
+            <a:avLst/>
+          </a:prstGeom>
+          <a:solidFill>
+            <a:schemeClr val="bg2"/>
+          </a:solidFill>
+          <a:ln>
+            <a:solidFill>
+              <a:schemeClr val="tx1">
+                <a:lumMod val="75000"/>
+                <a:lumOff val="25000"/>
+              </a:schemeClr>
+            </a:solidFill>
+          </a:ln>
+        </p:spPr>
+        <p:style>
+          <a:lnRef idx="2">
+            <a:schemeClr val="accent1">
+              <a:shade val="50000"/>
+            </a:schemeClr>
+          </a:lnRef>
+          <a:fillRef idx="1">
+            <a:schemeClr val="accent1"/>
+          </a:fillRef>
+          <a:effectRef idx="0">
+            <a:schemeClr val="accent1"/>
+          </a:effectRef>
+          <a:fontRef idx="minor">
+            <a:schemeClr val="lt1"/>
+          </a:fontRef>
+        </p:style>
+        <p:txBody>
+          <a:bodyPr rtlCol="0" anchor="ctr"/>
+          <a:lstStyle/>
+          <a:p>
+            <a:pPr algn="ctr"/>
+            <a:r>
+              <a:rPr lang="en-US" altLang="ja-JP" sz="1200" dirty="0" smtClean="0">
+                <a:solidFill>
+                  <a:schemeClr val="tx1">
+                    <a:lumMod val="75000"/>
+                    <a:lumOff val="25000"/>
+                  </a:schemeClr>
+                </a:solidFill>
+              </a:rPr>
+              <a:t>Location Name Finder</a:t>
+            </a:r>
+          </a:p>
+          <a:p>
+            <a:pPr algn="ctr"/>
+            <a:r>
+              <a:rPr lang="en-US" altLang="ja-JP" sz="1200" dirty="0" smtClean="0">
+                <a:solidFill>
+                  <a:schemeClr val="tx1">
+                    <a:lumMod val="75000"/>
+                    <a:lumOff val="25000"/>
+                  </a:schemeClr>
+                </a:solidFill>
+              </a:rPr>
+              <a:t>(</a:t>
+            </a:r>
+            <a:r>
+              <a:rPr lang="en-US" altLang="ja-JP" sz="1200" dirty="0" err="1" smtClean="0">
+                <a:solidFill>
+                  <a:schemeClr val="tx1">
+                    <a:lumMod val="75000"/>
+                    <a:lumOff val="25000"/>
+                  </a:schemeClr>
+                </a:solidFill>
+              </a:rPr>
+              <a:t>OpenNLP</a:t>
+            </a:r>
+            <a:r>
+              <a:rPr lang="en-US" altLang="ja-JP" sz="1200" dirty="0" smtClean="0">
+                <a:solidFill>
+                  <a:schemeClr val="tx1">
+                    <a:lumMod val="75000"/>
+                    <a:lumOff val="25000"/>
+                  </a:schemeClr>
+                </a:solidFill>
+              </a:rPr>
+              <a:t>)</a:t>
+            </a:r>
+            <a:endParaRPr kumimoji="1" lang="ja-JP" altLang="en-US" sz="1200" dirty="0" smtClean="0">
+              <a:solidFill>
+                <a:schemeClr val="tx1">
+                  <a:lumMod val="75000"/>
+                  <a:lumOff val="25000"/>
+                </a:schemeClr>
+              </a:solidFill>
+            </a:endParaRPr>
+          </a:p>
+        </p:txBody>
+      </p:sp>
+      <p:sp>
+        <p:nvSpPr>
+          <p:cNvPr id="29" name="正方形/長方形 28"/>
+          <p:cNvSpPr/>
+          <p:nvPr/>
+        </p:nvSpPr>
+        <p:spPr>
+          <a:xfrm>
+            <a:off x="2255494" y="5531230"/>
+            <a:ext cx="1081847" cy="291684"/>
+          </a:xfrm>
+          <a:prstGeom prst="rect">
+            <a:avLst/>
+          </a:prstGeom>
+          <a:solidFill>
+            <a:schemeClr val="bg2"/>
+          </a:solidFill>
+          <a:ln w="12700">
+            <a:solidFill>
+              <a:schemeClr val="tx1">
+                <a:lumMod val="75000"/>
+                <a:lumOff val="25000"/>
+              </a:schemeClr>
+            </a:solidFill>
+          </a:ln>
+        </p:spPr>
+        <p:style>
+          <a:lnRef idx="2">
+            <a:schemeClr val="accent1">
+              <a:shade val="50000"/>
+            </a:schemeClr>
+          </a:lnRef>
+          <a:fillRef idx="1">
+            <a:schemeClr val="accent1"/>
+          </a:fillRef>
+          <a:effectRef idx="0">
+            <a:schemeClr val="accent1"/>
+          </a:effectRef>
+          <a:fontRef idx="minor">
+            <a:schemeClr val="lt1"/>
+          </a:fontRef>
+        </p:style>
+        <p:txBody>
+          <a:bodyPr rtlCol="0" anchor="ctr"/>
+          <a:lstStyle/>
+          <a:p>
+            <a:pPr algn="ctr"/>
+            <a:r>
+              <a:rPr kumimoji="1" lang="en-US" altLang="ja-JP" sz="1050" dirty="0" err="1" smtClean="0">
+                <a:solidFill>
+                  <a:schemeClr val="tx1">
+                    <a:lumMod val="75000"/>
+                    <a:lumOff val="25000"/>
+                  </a:schemeClr>
+                </a:solidFill>
+              </a:rPr>
+              <a:t>body_location</a:t>
+            </a:r>
+            <a:endParaRPr kumimoji="1" lang="ja-JP" altLang="en-US" sz="1050" dirty="0" smtClean="0">
+              <a:solidFill>
+                <a:schemeClr val="tx1">
+                  <a:lumMod val="75000"/>
+                  <a:lumOff val="25000"/>
+                </a:schemeClr>
+              </a:solidFill>
+            </a:endParaRPr>
+          </a:p>
+        </p:txBody>
+      </p:sp>
+      <p:sp>
+        <p:nvSpPr>
+          <p:cNvPr id="30" name="正方形/長方形 29"/>
+          <p:cNvSpPr/>
+          <p:nvPr/>
+        </p:nvSpPr>
+        <p:spPr>
+          <a:xfrm>
+            <a:off x="2258948" y="5797960"/>
+            <a:ext cx="1078393" cy="291684"/>
+          </a:xfrm>
+          <a:prstGeom prst="rect">
+            <a:avLst/>
+          </a:prstGeom>
+          <a:solidFill>
+            <a:schemeClr val="bg1"/>
+          </a:solidFill>
+          <a:ln w="12700">
+            <a:solidFill>
+              <a:schemeClr val="tx1">
+                <a:lumMod val="75000"/>
+                <a:lumOff val="25000"/>
+              </a:schemeClr>
+            </a:solidFill>
+          </a:ln>
+        </p:spPr>
+        <p:style>
+          <a:lnRef idx="2">
+            <a:schemeClr val="accent1">
+              <a:shade val="50000"/>
+            </a:schemeClr>
+          </a:lnRef>
+          <a:fillRef idx="1">
+            <a:schemeClr val="accent1"/>
+          </a:fillRef>
+          <a:effectRef idx="0">
+            <a:schemeClr val="accent1"/>
+          </a:effectRef>
+          <a:fontRef idx="minor">
+            <a:schemeClr val="lt1"/>
+          </a:fontRef>
+        </p:style>
+        <p:txBody>
+          <a:bodyPr rtlCol="0" anchor="ctr"/>
+          <a:lstStyle/>
+          <a:p>
+            <a:r>
+              <a:rPr lang="en-US" altLang="ja-JP" sz="1050" dirty="0">
+                <a:solidFill>
+                  <a:schemeClr val="tx1">
+                    <a:lumMod val="75000"/>
+                    <a:lumOff val="25000"/>
+                  </a:schemeClr>
+                </a:solidFill>
+              </a:rPr>
+              <a:t>H</a:t>
+            </a:r>
+            <a:r>
+              <a:rPr lang="en-US" altLang="ja-JP" sz="1050" dirty="0" smtClean="0">
+                <a:solidFill>
+                  <a:schemeClr val="tx1">
+                    <a:lumMod val="75000"/>
+                    <a:lumOff val="25000"/>
+                  </a:schemeClr>
+                </a:solidFill>
+              </a:rPr>
+              <a:t>awaii</a:t>
+            </a:r>
+            <a:endParaRPr kumimoji="1" lang="ja-JP" altLang="en-US" sz="1050" dirty="0" smtClean="0">
+              <a:solidFill>
+                <a:schemeClr val="tx1">
+                  <a:lumMod val="75000"/>
+                  <a:lumOff val="25000"/>
+                </a:schemeClr>
+              </a:solidFill>
+            </a:endParaRPr>
+          </a:p>
+        </p:txBody>
+      </p:sp>
+      <p:sp>
+        <p:nvSpPr>
+          <p:cNvPr id="31" name="正方形/長方形 30"/>
+          <p:cNvSpPr/>
+          <p:nvPr/>
+        </p:nvSpPr>
+        <p:spPr>
+          <a:xfrm>
+            <a:off x="2258948" y="6089644"/>
+            <a:ext cx="1078393" cy="291684"/>
+          </a:xfrm>
+          <a:prstGeom prst="rect">
+            <a:avLst/>
+          </a:prstGeom>
+          <a:solidFill>
+            <a:schemeClr val="bg1"/>
+          </a:solidFill>
+          <a:ln w="12700">
+            <a:solidFill>
+              <a:schemeClr val="tx1">
+                <a:lumMod val="75000"/>
+                <a:lumOff val="25000"/>
+              </a:schemeClr>
+            </a:solidFill>
+          </a:ln>
+        </p:spPr>
+        <p:style>
+          <a:lnRef idx="2">
+            <a:schemeClr val="accent1">
+              <a:shade val="50000"/>
+            </a:schemeClr>
+          </a:lnRef>
+          <a:fillRef idx="1">
+            <a:schemeClr val="accent1"/>
+          </a:fillRef>
+          <a:effectRef idx="0">
+            <a:schemeClr val="accent1"/>
+          </a:effectRef>
+          <a:fontRef idx="minor">
+            <a:schemeClr val="lt1"/>
+          </a:fontRef>
+        </p:style>
+        <p:txBody>
+          <a:bodyPr rtlCol="0" anchor="ctr"/>
+          <a:lstStyle/>
+          <a:p>
+            <a:r>
+              <a:rPr lang="en-US" altLang="ja-JP" sz="1050" dirty="0" smtClean="0">
+                <a:solidFill>
+                  <a:schemeClr val="tx1">
+                    <a:lumMod val="75000"/>
+                    <a:lumOff val="25000"/>
+                  </a:schemeClr>
+                </a:solidFill>
+              </a:rPr>
+              <a:t>New York</a:t>
+            </a:r>
+            <a:endParaRPr kumimoji="1" lang="ja-JP" altLang="en-US" sz="1050" dirty="0" smtClean="0">
+              <a:solidFill>
+                <a:schemeClr val="tx1">
+                  <a:lumMod val="75000"/>
+                  <a:lumOff val="25000"/>
+                </a:schemeClr>
+              </a:solidFill>
+            </a:endParaRPr>
+          </a:p>
+        </p:txBody>
+      </p:sp>
+      <p:cxnSp>
+        <p:nvCxnSpPr>
+          <p:cNvPr id="32" name="カギ線コネクタ 31"/>
+          <p:cNvCxnSpPr>
+            <a:stCxn id="19" idx="3"/>
+            <a:endCxn id="28" idx="1"/>
+          </p:cNvCxnSpPr>
+          <p:nvPr/>
+        </p:nvCxnSpPr>
+        <p:spPr>
+          <a:xfrm>
+            <a:off x="2771800" y="4700351"/>
+            <a:ext cx="779839" cy="297766"/>
+          </a:xfrm>
+          <a:prstGeom prst="bentConnector3">
+            <a:avLst>
+              <a:gd name="adj1" fmla="val 50000"/>
+            </a:avLst>
+          </a:prstGeom>
+          <a:ln w="15875">
+            <a:solidFill>
+              <a:schemeClr val="tx1">
+                <a:lumMod val="75000"/>
+                <a:lumOff val="25000"/>
+              </a:schemeClr>
+            </a:solidFill>
+            <a:headEnd type="arrow"/>
+            <a:tailEnd type="none"/>
+          </a:ln>
+        </p:spPr>
+        <p:style>
+          <a:lnRef idx="1">
+            <a:schemeClr val="accent1"/>
+          </a:lnRef>
+          <a:fillRef idx="0">
+            <a:schemeClr val="accent1"/>
+          </a:fillRef>
+          <a:effectRef idx="0">
+            <a:schemeClr val="accent1"/>
+          </a:effectRef>
+          <a:fontRef idx="minor">
+            <a:schemeClr val="tx1"/>
+          </a:fontRef>
+        </p:style>
+      </p:cxnSp>
+      <p:sp>
+        <p:nvSpPr>
+          <p:cNvPr id="33" name="下矢印 32"/>
+          <p:cNvSpPr/>
+          <p:nvPr/>
+        </p:nvSpPr>
+        <p:spPr>
+          <a:xfrm>
+            <a:off x="1621399" y="4005064"/>
+            <a:ext cx="646345" cy="288032"/>
+          </a:xfrm>
+          <a:prstGeom prst="downArrow">
+            <a:avLst/>
+          </a:prstGeom>
+          <a:solidFill>
+            <a:schemeClr val="bg1"/>
+          </a:solidFill>
+          <a:ln w="12700">
+            <a:solidFill>
+              <a:schemeClr val="tx1">
+                <a:lumMod val="75000"/>
+                <a:lumOff val="25000"/>
+              </a:schemeClr>
+            </a:solidFill>
+          </a:ln>
+        </p:spPr>
+        <p:style>
+          <a:lnRef idx="2">
+            <a:schemeClr val="accent1">
+              <a:shade val="50000"/>
+            </a:schemeClr>
+          </a:lnRef>
+          <a:fillRef idx="1">
+            <a:schemeClr val="accent1"/>
+          </a:fillRef>
+          <a:effectRef idx="0">
+            <a:schemeClr val="accent1"/>
+          </a:effectRef>
+          <a:fontRef idx="minor">
+            <a:schemeClr val="lt1"/>
+          </a:fontRef>
+        </p:style>
+        <p:txBody>
+          <a:bodyPr rtlCol="0" anchor="ctr"/>
+          <a:lstStyle/>
+          <a:p>
+            <a:pPr algn="ctr"/>
+            <a:endParaRPr kumimoji="1" lang="ja-JP" altLang="en-US" dirty="0" smtClean="0">
+              <a:solidFill>
+                <a:schemeClr val="tx1">
+                  <a:lumMod val="75000"/>
+                  <a:lumOff val="25000"/>
+                </a:schemeClr>
+              </a:solidFill>
+            </a:endParaRPr>
+          </a:p>
+        </p:txBody>
+      </p:sp>
+      <p:sp>
+        <p:nvSpPr>
+          <p:cNvPr id="34" name="下矢印 33"/>
+          <p:cNvSpPr/>
+          <p:nvPr/>
+        </p:nvSpPr>
+        <p:spPr>
+          <a:xfrm>
+            <a:off x="1621399" y="5171190"/>
+            <a:ext cx="646345" cy="288032"/>
+          </a:xfrm>
+          <a:prstGeom prst="downArrow">
+            <a:avLst/>
+          </a:prstGeom>
+          <a:solidFill>
+            <a:schemeClr val="bg1"/>
+          </a:solidFill>
+          <a:ln w="12700">
+            <a:solidFill>
+              <a:schemeClr val="tx1">
+                <a:lumMod val="75000"/>
+                <a:lumOff val="25000"/>
+              </a:schemeClr>
+            </a:solidFill>
+          </a:ln>
+        </p:spPr>
+        <p:style>
+          <a:lnRef idx="2">
+            <a:schemeClr val="accent1">
+              <a:shade val="50000"/>
+            </a:schemeClr>
+          </a:lnRef>
+          <a:fillRef idx="1">
+            <a:schemeClr val="accent1"/>
+          </a:fillRef>
+          <a:effectRef idx="0">
+            <a:schemeClr val="accent1"/>
+          </a:effectRef>
+          <a:fontRef idx="minor">
+            <a:schemeClr val="lt1"/>
+          </a:fontRef>
+        </p:style>
+        <p:txBody>
+          <a:bodyPr rtlCol="0" anchor="ctr"/>
+          <a:lstStyle/>
+          <a:p>
+            <a:pPr algn="ctr"/>
+            <a:endParaRPr kumimoji="1" lang="ja-JP" altLang="en-US" dirty="0" smtClean="0">
+              <a:solidFill>
+                <a:schemeClr val="tx1">
+                  <a:lumMod val="75000"/>
+                  <a:lumOff val="25000"/>
+                </a:schemeClr>
+              </a:solidFill>
+            </a:endParaRPr>
+          </a:p>
+        </p:txBody>
+      </p:sp>
+      <p:sp>
+        <p:nvSpPr>
+          <p:cNvPr id="70" name="正方形/長方形 69"/>
+          <p:cNvSpPr/>
+          <p:nvPr/>
+        </p:nvSpPr>
+        <p:spPr>
+          <a:xfrm>
+            <a:off x="3337341" y="5531230"/>
+            <a:ext cx="2156786" cy="291684"/>
+          </a:xfrm>
+          <a:prstGeom prst="rect">
+            <a:avLst/>
+          </a:prstGeom>
+          <a:solidFill>
+            <a:schemeClr val="bg2"/>
+          </a:solidFill>
+          <a:ln w="12700">
+            <a:solidFill>
+              <a:schemeClr val="tx1">
+                <a:lumMod val="75000"/>
+                <a:lumOff val="25000"/>
+              </a:schemeClr>
+            </a:solidFill>
+          </a:ln>
+        </p:spPr>
+        <p:style>
+          <a:lnRef idx="2">
+            <a:schemeClr val="accent1">
+              <a:shade val="50000"/>
+            </a:schemeClr>
+          </a:lnRef>
+          <a:fillRef idx="1">
+            <a:schemeClr val="accent1"/>
+          </a:fillRef>
+          <a:effectRef idx="0">
+            <a:schemeClr val="accent1"/>
+          </a:effectRef>
+          <a:fontRef idx="minor">
+            <a:schemeClr val="lt1"/>
+          </a:fontRef>
+        </p:style>
+        <p:txBody>
+          <a:bodyPr rtlCol="0" anchor="ctr"/>
+          <a:lstStyle/>
+          <a:p>
+            <a:pPr algn="ctr"/>
+            <a:r>
+              <a:rPr kumimoji="1" lang="en-US" altLang="ja-JP" sz="1050" dirty="0" smtClean="0">
+                <a:solidFill>
+                  <a:schemeClr val="tx1">
+                    <a:lumMod val="75000"/>
+                    <a:lumOff val="25000"/>
+                  </a:schemeClr>
+                </a:solidFill>
+              </a:rPr>
+              <a:t>body</a:t>
+            </a:r>
+            <a:endParaRPr kumimoji="1" lang="ja-JP" altLang="en-US" sz="1050" dirty="0" smtClean="0">
+              <a:solidFill>
+                <a:schemeClr val="tx1">
+                  <a:lumMod val="75000"/>
+                  <a:lumOff val="25000"/>
+                </a:schemeClr>
+              </a:solidFill>
+            </a:endParaRPr>
+          </a:p>
+        </p:txBody>
+      </p:sp>
+      <p:sp>
+        <p:nvSpPr>
+          <p:cNvPr id="71" name="正方形/長方形 70"/>
+          <p:cNvSpPr/>
+          <p:nvPr/>
+        </p:nvSpPr>
+        <p:spPr>
+          <a:xfrm>
+            <a:off x="3340795" y="5797960"/>
+            <a:ext cx="2156786" cy="291684"/>
+          </a:xfrm>
+          <a:prstGeom prst="rect">
+            <a:avLst/>
+          </a:prstGeom>
+          <a:solidFill>
+            <a:schemeClr val="bg1"/>
+          </a:solidFill>
+          <a:ln w="12700">
+            <a:solidFill>
+              <a:schemeClr val="tx1">
+                <a:lumMod val="75000"/>
+                <a:lumOff val="25000"/>
+              </a:schemeClr>
+            </a:solidFill>
+          </a:ln>
+        </p:spPr>
+        <p:style>
+          <a:lnRef idx="2">
+            <a:schemeClr val="accent1">
+              <a:shade val="50000"/>
+            </a:schemeClr>
+          </a:lnRef>
+          <a:fillRef idx="1">
+            <a:schemeClr val="accent1"/>
+          </a:fillRef>
+          <a:effectRef idx="0">
+            <a:schemeClr val="accent1"/>
+          </a:effectRef>
+          <a:fontRef idx="minor">
+            <a:schemeClr val="lt1"/>
+          </a:fontRef>
+        </p:style>
+        <p:txBody>
+          <a:bodyPr rtlCol="0" anchor="ctr"/>
+          <a:lstStyle/>
+          <a:p>
+            <a:r>
+              <a:rPr lang="en-US" altLang="ja-JP" sz="1050" dirty="0" smtClean="0">
+                <a:solidFill>
+                  <a:schemeClr val="tx1">
+                    <a:lumMod val="75000"/>
+                    <a:lumOff val="25000"/>
+                  </a:schemeClr>
+                </a:solidFill>
+              </a:rPr>
+              <a:t>Mark and John go to </a:t>
+            </a:r>
+            <a:r>
+              <a:rPr lang="en-US" altLang="ja-JP" sz="1050" dirty="0">
+                <a:solidFill>
+                  <a:schemeClr val="tx1">
+                    <a:lumMod val="75000"/>
+                    <a:lumOff val="25000"/>
+                  </a:schemeClr>
+                </a:solidFill>
+              </a:rPr>
+              <a:t>H</a:t>
+            </a:r>
+            <a:r>
+              <a:rPr lang="en-US" altLang="ja-JP" sz="1050" dirty="0" smtClean="0">
+                <a:solidFill>
+                  <a:schemeClr val="tx1">
+                    <a:lumMod val="75000"/>
+                    <a:lumOff val="25000"/>
+                  </a:schemeClr>
+                </a:solidFill>
+              </a:rPr>
+              <a:t>awaii …</a:t>
+            </a:r>
+            <a:endParaRPr kumimoji="1" lang="ja-JP" altLang="en-US" sz="1050" dirty="0" smtClean="0">
+              <a:solidFill>
+                <a:schemeClr val="tx1">
+                  <a:lumMod val="75000"/>
+                  <a:lumOff val="25000"/>
+                </a:schemeClr>
+              </a:solidFill>
+            </a:endParaRPr>
+          </a:p>
+        </p:txBody>
+      </p:sp>
+      <p:sp>
+        <p:nvSpPr>
+          <p:cNvPr id="72" name="正方形/長方形 71"/>
+          <p:cNvSpPr/>
+          <p:nvPr/>
+        </p:nvSpPr>
+        <p:spPr>
+          <a:xfrm>
+            <a:off x="3340795" y="6089644"/>
+            <a:ext cx="2156786" cy="291684"/>
+          </a:xfrm>
+          <a:prstGeom prst="rect">
+            <a:avLst/>
+          </a:prstGeom>
+          <a:solidFill>
+            <a:schemeClr val="bg1"/>
+          </a:solidFill>
+          <a:ln w="12700">
+            <a:solidFill>
+              <a:schemeClr val="tx1">
+                <a:lumMod val="75000"/>
+                <a:lumOff val="25000"/>
+              </a:schemeClr>
+            </a:solidFill>
+          </a:ln>
+        </p:spPr>
+        <p:style>
+          <a:lnRef idx="2">
+            <a:schemeClr val="accent1">
+              <a:shade val="50000"/>
+            </a:schemeClr>
+          </a:lnRef>
+          <a:fillRef idx="1">
+            <a:schemeClr val="accent1"/>
+          </a:fillRef>
+          <a:effectRef idx="0">
+            <a:schemeClr val="accent1"/>
+          </a:effectRef>
+          <a:fontRef idx="minor">
+            <a:schemeClr val="lt1"/>
+          </a:fontRef>
+        </p:style>
+        <p:txBody>
+          <a:bodyPr rtlCol="0" anchor="ctr"/>
+          <a:lstStyle/>
+          <a:p>
+            <a:r>
+              <a:rPr lang="en-US" altLang="ja-JP" sz="1050" dirty="0" smtClean="0">
+                <a:solidFill>
+                  <a:schemeClr val="tx1">
+                    <a:lumMod val="75000"/>
+                    <a:lumOff val="25000"/>
+                  </a:schemeClr>
+                </a:solidFill>
+              </a:rPr>
+              <a:t>Chris  is planning…. at New York …</a:t>
+            </a:r>
+            <a:endParaRPr kumimoji="1" lang="ja-JP" altLang="en-US" sz="1050" dirty="0" smtClean="0">
+              <a:solidFill>
+                <a:schemeClr val="tx1">
+                  <a:lumMod val="75000"/>
+                  <a:lumOff val="25000"/>
+                </a:schemeClr>
+              </a:solidFill>
+            </a:endParaRPr>
+          </a:p>
+        </p:txBody>
+      </p:sp>
+      <p:sp>
+        <p:nvSpPr>
+          <p:cNvPr id="73" name="テキスト ボックス 72"/>
+          <p:cNvSpPr txBox="1"/>
+          <p:nvPr/>
+        </p:nvSpPr>
+        <p:spPr>
+          <a:xfrm>
+            <a:off x="2339752" y="5191308"/>
+            <a:ext cx="3744416" cy="253916"/>
+          </a:xfrm>
+          <a:prstGeom prst="rect">
+            <a:avLst/>
+          </a:prstGeom>
+          <a:noFill/>
+        </p:spPr>
+        <p:txBody>
+          <a:bodyPr wrap="square" rtlCol="0">
+            <a:spAutoFit/>
+          </a:bodyPr>
+          <a:lstStyle/>
+          <a:p>
+            <a:r>
+              <a:rPr lang="en-US" altLang="ja-JP" sz="1050" dirty="0" smtClean="0">
+                <a:solidFill>
+                  <a:schemeClr val="tx1">
+                    <a:lumMod val="75000"/>
+                    <a:lumOff val="25000"/>
+                  </a:schemeClr>
+                </a:solidFill>
+              </a:rPr>
+              <a:t>Extract Named Entity from natural language text  using models.</a:t>
+            </a:r>
+          </a:p>
+        </p:txBody>
+      </p:sp>
+      <p:sp>
+        <p:nvSpPr>
+          <p:cNvPr id="74" name="角丸四角形 73"/>
+          <p:cNvSpPr/>
+          <p:nvPr/>
+        </p:nvSpPr>
+        <p:spPr>
+          <a:xfrm>
+            <a:off x="3578345" y="3645024"/>
+            <a:ext cx="1569719" cy="686229"/>
+          </a:xfrm>
+          <a:prstGeom prst="roundRect">
+            <a:avLst/>
+          </a:prstGeom>
+          <a:solidFill>
+            <a:schemeClr val="bg2"/>
+          </a:solidFill>
+          <a:ln>
+            <a:solidFill>
+              <a:schemeClr val="tx1">
+                <a:lumMod val="75000"/>
+                <a:lumOff val="25000"/>
+              </a:schemeClr>
+            </a:solidFill>
+          </a:ln>
+        </p:spPr>
+        <p:style>
+          <a:lnRef idx="2">
+            <a:schemeClr val="accent1">
+              <a:shade val="50000"/>
+            </a:schemeClr>
+          </a:lnRef>
+          <a:fillRef idx="1">
+            <a:schemeClr val="accent1"/>
+          </a:fillRef>
+          <a:effectRef idx="0">
+            <a:schemeClr val="accent1"/>
+          </a:effectRef>
+          <a:fontRef idx="minor">
+            <a:schemeClr val="lt1"/>
+          </a:fontRef>
+        </p:style>
+        <p:txBody>
+          <a:bodyPr rtlCol="0" anchor="ctr"/>
+          <a:lstStyle/>
+          <a:p>
+            <a:pPr algn="ctr"/>
+            <a:r>
+              <a:rPr kumimoji="1" lang="en-US" altLang="ja-JP" sz="1200" dirty="0" smtClean="0">
+                <a:solidFill>
+                  <a:schemeClr val="tx1">
+                    <a:lumMod val="75000"/>
+                    <a:lumOff val="25000"/>
+                  </a:schemeClr>
+                </a:solidFill>
+              </a:rPr>
+              <a:t>Sentence Detector</a:t>
+            </a:r>
+          </a:p>
+          <a:p>
+            <a:pPr algn="ctr"/>
+            <a:r>
+              <a:rPr lang="en-US" altLang="ja-JP" sz="1200" dirty="0" smtClean="0">
+                <a:solidFill>
+                  <a:schemeClr val="tx1">
+                    <a:lumMod val="75000"/>
+                    <a:lumOff val="25000"/>
+                  </a:schemeClr>
+                </a:solidFill>
+              </a:rPr>
+              <a:t>Tokenizer</a:t>
+            </a:r>
+            <a:endParaRPr kumimoji="1" lang="en-US" altLang="ja-JP" sz="1200" dirty="0" smtClean="0">
+              <a:solidFill>
+                <a:schemeClr val="tx1">
+                  <a:lumMod val="75000"/>
+                  <a:lumOff val="25000"/>
+                </a:schemeClr>
+              </a:solidFill>
+            </a:endParaRPr>
+          </a:p>
+          <a:p>
+            <a:pPr algn="ctr"/>
+            <a:r>
+              <a:rPr lang="en-US" altLang="ja-JP" sz="1200" dirty="0" smtClean="0">
+                <a:solidFill>
+                  <a:schemeClr val="tx1">
+                    <a:lumMod val="75000"/>
+                    <a:lumOff val="25000"/>
+                  </a:schemeClr>
+                </a:solidFill>
+              </a:rPr>
+              <a:t>(</a:t>
+            </a:r>
+            <a:r>
+              <a:rPr lang="en-US" altLang="ja-JP" sz="1200" dirty="0" err="1" smtClean="0">
+                <a:solidFill>
+                  <a:schemeClr val="tx1">
+                    <a:lumMod val="75000"/>
+                    <a:lumOff val="25000"/>
+                  </a:schemeClr>
+                </a:solidFill>
+              </a:rPr>
+              <a:t>OpenNLP</a:t>
+            </a:r>
+            <a:r>
+              <a:rPr lang="en-US" altLang="ja-JP" sz="1200" dirty="0" smtClean="0">
+                <a:solidFill>
+                  <a:schemeClr val="tx1">
+                    <a:lumMod val="75000"/>
+                    <a:lumOff val="25000"/>
+                  </a:schemeClr>
+                </a:solidFill>
+              </a:rPr>
+              <a:t>)</a:t>
+            </a:r>
+            <a:endParaRPr kumimoji="1" lang="ja-JP" altLang="en-US" sz="1200" dirty="0" smtClean="0">
+              <a:solidFill>
+                <a:schemeClr val="tx1">
+                  <a:lumMod val="75000"/>
+                  <a:lumOff val="25000"/>
+                </a:schemeClr>
+              </a:solidFill>
+            </a:endParaRPr>
+          </a:p>
+        </p:txBody>
+      </p:sp>
+      <p:sp>
+        <p:nvSpPr>
+          <p:cNvPr id="75" name="正方形/長方形 74"/>
+          <p:cNvSpPr/>
+          <p:nvPr/>
+        </p:nvSpPr>
+        <p:spPr>
+          <a:xfrm>
+            <a:off x="1046701" y="1988840"/>
+            <a:ext cx="1725099" cy="625650"/>
+          </a:xfrm>
+          <a:prstGeom prst="rect">
+            <a:avLst/>
+          </a:prstGeom>
+          <a:solidFill>
+            <a:schemeClr val="bg2"/>
+          </a:solidFill>
+          <a:ln>
+            <a:solidFill>
+              <a:schemeClr val="tx1">
+                <a:lumMod val="75000"/>
+                <a:lumOff val="25000"/>
+              </a:schemeClr>
+            </a:solidFill>
+          </a:ln>
+        </p:spPr>
+        <p:style>
+          <a:lnRef idx="2">
+            <a:schemeClr val="accent1">
+              <a:shade val="50000"/>
+            </a:schemeClr>
+          </a:lnRef>
+          <a:fillRef idx="1">
+            <a:schemeClr val="accent1"/>
+          </a:fillRef>
+          <a:effectRef idx="0">
+            <a:schemeClr val="accent1"/>
+          </a:effectRef>
+          <a:fontRef idx="minor">
+            <a:schemeClr val="lt1"/>
+          </a:fontRef>
+        </p:style>
+        <p:txBody>
+          <a:bodyPr rot="0" spcFirstLastPara="0" vertOverflow="overflow" horzOverflow="overflow" vert="horz" wrap="square" lIns="91440" tIns="45720" rIns="91440" bIns="45720" numCol="1" spcCol="0" rtlCol="0" fromWordArt="0" anchor="ctr" anchorCtr="0" forceAA="0" compatLnSpc="1">
+            <a:prstTxWarp prst="textNoShape">
+              <a:avLst/>
+            </a:prstTxWarp>
+            <a:noAutofit/>
+          </a:bodyPr>
+          <a:lstStyle/>
+          <a:p>
+            <a:pPr algn="ctr"/>
+            <a:r>
+              <a:rPr lang="en-US" altLang="ja-JP" sz="1200" b="1" dirty="0" err="1" smtClean="0">
+                <a:solidFill>
+                  <a:schemeClr val="tx1">
+                    <a:lumMod val="75000"/>
+                    <a:lumOff val="25000"/>
+                  </a:schemeClr>
+                </a:solidFill>
+              </a:rPr>
+              <a:t>CsvData</a:t>
+            </a:r>
+            <a:endParaRPr lang="en-US" altLang="ja-JP" sz="1200" b="1" dirty="0" smtClean="0">
+              <a:solidFill>
+                <a:schemeClr val="tx1">
+                  <a:lumMod val="75000"/>
+                  <a:lumOff val="25000"/>
+                </a:schemeClr>
+              </a:solidFill>
+            </a:endParaRPr>
+          </a:p>
+          <a:p>
+            <a:pPr algn="ctr"/>
+            <a:r>
+              <a:rPr lang="en-US" altLang="ja-JP" sz="1200" b="1" dirty="0" smtClean="0">
+                <a:solidFill>
+                  <a:schemeClr val="tx1">
+                    <a:lumMod val="75000"/>
+                    <a:lumOff val="25000"/>
+                  </a:schemeClr>
+                </a:solidFill>
+              </a:rPr>
+              <a:t>Processor</a:t>
+            </a:r>
+          </a:p>
+          <a:p>
+            <a:pPr algn="ctr"/>
+            <a:r>
+              <a:rPr lang="ja-JP" altLang="en-US" sz="1200" b="1" dirty="0" smtClean="0">
+                <a:solidFill>
+                  <a:schemeClr val="tx1">
+                    <a:lumMod val="75000"/>
+                    <a:lumOff val="25000"/>
+                  </a:schemeClr>
+                </a:solidFill>
+              </a:rPr>
+              <a:t>（</a:t>
+            </a:r>
+            <a:r>
+              <a:rPr lang="en-US" altLang="ja-JP" sz="1200" b="1" dirty="0" smtClean="0">
+                <a:solidFill>
+                  <a:schemeClr val="tx1">
+                    <a:lumMod val="75000"/>
+                    <a:lumOff val="25000"/>
+                  </a:schemeClr>
+                </a:solidFill>
+              </a:rPr>
+              <a:t>NLP4L</a:t>
+            </a:r>
+            <a:r>
+              <a:rPr lang="ja-JP" altLang="en-US" sz="1200" b="1" dirty="0" smtClean="0">
+                <a:solidFill>
+                  <a:schemeClr val="tx1">
+                    <a:lumMod val="75000"/>
+                    <a:lumOff val="25000"/>
+                  </a:schemeClr>
+                </a:solidFill>
+              </a:rPr>
+              <a:t>）</a:t>
+            </a:r>
+            <a:endParaRPr lang="en-US" altLang="ja-JP" sz="1200" b="1" dirty="0">
+              <a:solidFill>
+                <a:schemeClr val="tx1">
+                  <a:lumMod val="75000"/>
+                  <a:lumOff val="25000"/>
+                </a:schemeClr>
+              </a:solidFill>
+            </a:endParaRPr>
+          </a:p>
+        </p:txBody>
+      </p:sp>
+      <p:sp>
+        <p:nvSpPr>
+          <p:cNvPr id="76" name="テキスト ボックス 75"/>
+          <p:cNvSpPr txBox="1"/>
+          <p:nvPr/>
+        </p:nvSpPr>
+        <p:spPr>
+          <a:xfrm>
+            <a:off x="3113364" y="1844824"/>
+            <a:ext cx="2610764" cy="577081"/>
+          </a:xfrm>
+          <a:prstGeom prst="rect">
+            <a:avLst/>
+          </a:prstGeom>
+          <a:noFill/>
+          <a:ln>
+            <a:solidFill>
+              <a:schemeClr val="tx1"/>
+            </a:solidFill>
+          </a:ln>
+        </p:spPr>
+        <p:txBody>
+          <a:bodyPr wrap="square" rtlCol="0">
+            <a:spAutoFit/>
+          </a:bodyPr>
+          <a:lstStyle/>
+          <a:p>
+            <a:r>
+              <a:rPr lang="en-US" altLang="ja-JP" sz="1050" dirty="0" smtClean="0">
+                <a:solidFill>
+                  <a:schemeClr val="tx1">
+                    <a:lumMod val="75000"/>
+                    <a:lumOff val="25000"/>
+                  </a:schemeClr>
+                </a:solidFill>
+              </a:rPr>
+              <a:t>#001,  Mark </a:t>
+            </a:r>
+            <a:r>
+              <a:rPr lang="en-US" altLang="ja-JP" sz="1050" dirty="0">
+                <a:solidFill>
+                  <a:schemeClr val="tx1">
+                    <a:lumMod val="75000"/>
+                    <a:lumOff val="25000"/>
+                  </a:schemeClr>
+                </a:solidFill>
+              </a:rPr>
+              <a:t>and John go to Hawaii </a:t>
+            </a:r>
+            <a:r>
+              <a:rPr lang="en-US" altLang="ja-JP" sz="1050" dirty="0" smtClean="0">
+                <a:solidFill>
+                  <a:schemeClr val="tx1">
+                    <a:lumMod val="75000"/>
+                    <a:lumOff val="25000"/>
+                  </a:schemeClr>
+                </a:solidFill>
+              </a:rPr>
+              <a:t>…</a:t>
+            </a:r>
+          </a:p>
+          <a:p>
+            <a:r>
+              <a:rPr lang="en-US" altLang="ja-JP" sz="1050" dirty="0" smtClean="0">
+                <a:solidFill>
+                  <a:schemeClr val="tx1">
+                    <a:lumMod val="75000"/>
+                    <a:lumOff val="25000"/>
+                  </a:schemeClr>
+                </a:solidFill>
+              </a:rPr>
+              <a:t>#002, </a:t>
+            </a:r>
+            <a:r>
+              <a:rPr lang="en-US" altLang="ja-JP" sz="1050" dirty="0">
+                <a:solidFill>
+                  <a:schemeClr val="tx1">
+                    <a:lumMod val="75000"/>
+                    <a:lumOff val="25000"/>
+                  </a:schemeClr>
+                </a:solidFill>
+              </a:rPr>
+              <a:t>Chris  is planning…. at New York </a:t>
+            </a:r>
+            <a:r>
+              <a:rPr lang="en-US" altLang="ja-JP" sz="1050" dirty="0" smtClean="0">
+                <a:solidFill>
+                  <a:schemeClr val="tx1">
+                    <a:lumMod val="75000"/>
+                    <a:lumOff val="25000"/>
+                  </a:schemeClr>
+                </a:solidFill>
+              </a:rPr>
+              <a:t>…</a:t>
+            </a:r>
+          </a:p>
+          <a:p>
+            <a:r>
+              <a:rPr lang="en-US" altLang="ja-JP" sz="1050" dirty="0" smtClean="0">
+                <a:solidFill>
+                  <a:schemeClr val="tx1">
+                    <a:lumMod val="75000"/>
+                    <a:lumOff val="25000"/>
+                  </a:schemeClr>
+                </a:solidFill>
+              </a:rPr>
+              <a:t>…</a:t>
+            </a:r>
+            <a:endParaRPr lang="ja-JP" altLang="en-US" sz="1050" dirty="0">
+              <a:solidFill>
+                <a:schemeClr val="tx1">
+                  <a:lumMod val="75000"/>
+                  <a:lumOff val="25000"/>
+                </a:schemeClr>
+              </a:solidFill>
+            </a:endParaRPr>
+          </a:p>
+        </p:txBody>
+      </p:sp>
+      <p:cxnSp>
+        <p:nvCxnSpPr>
+          <p:cNvPr id="77" name="カギ線コネクタ 76"/>
+          <p:cNvCxnSpPr>
+            <a:stCxn id="19" idx="3"/>
+            <a:endCxn id="74" idx="1"/>
+          </p:cNvCxnSpPr>
+          <p:nvPr/>
+        </p:nvCxnSpPr>
+        <p:spPr>
+          <a:xfrm flipV="1">
+            <a:off x="2771800" y="3988139"/>
+            <a:ext cx="806545" cy="712212"/>
+          </a:xfrm>
+          <a:prstGeom prst="bentConnector3">
+            <a:avLst>
+              <a:gd name="adj1" fmla="val 50000"/>
+            </a:avLst>
+          </a:prstGeom>
+          <a:ln w="15875">
+            <a:solidFill>
+              <a:schemeClr val="tx1">
+                <a:lumMod val="75000"/>
+                <a:lumOff val="25000"/>
+              </a:schemeClr>
+            </a:solidFill>
+            <a:headEnd type="arrow"/>
+            <a:tailEnd type="none"/>
+          </a:ln>
+        </p:spPr>
+        <p:style>
+          <a:lnRef idx="1">
+            <a:schemeClr val="accent1"/>
+          </a:lnRef>
+          <a:fillRef idx="0">
+            <a:schemeClr val="accent1"/>
+          </a:fillRef>
+          <a:effectRef idx="0">
+            <a:schemeClr val="accent1"/>
+          </a:effectRef>
+          <a:fontRef idx="minor">
+            <a:schemeClr val="tx1"/>
+          </a:fontRef>
+        </p:style>
+      </p:cxnSp>
+      <p:sp>
+        <p:nvSpPr>
+          <p:cNvPr id="78" name="下矢印 77"/>
+          <p:cNvSpPr/>
+          <p:nvPr/>
+        </p:nvSpPr>
+        <p:spPr>
+          <a:xfrm>
+            <a:off x="1566235" y="2708920"/>
+            <a:ext cx="646345" cy="288032"/>
+          </a:xfrm>
+          <a:prstGeom prst="downArrow">
+            <a:avLst/>
+          </a:prstGeom>
+          <a:solidFill>
+            <a:schemeClr val="bg1"/>
+          </a:solidFill>
+          <a:ln w="12700">
+            <a:solidFill>
+              <a:schemeClr val="tx1">
+                <a:lumMod val="75000"/>
+                <a:lumOff val="25000"/>
+              </a:schemeClr>
+            </a:solidFill>
+          </a:ln>
+        </p:spPr>
+        <p:style>
+          <a:lnRef idx="2">
+            <a:schemeClr val="accent1">
+              <a:shade val="50000"/>
+            </a:schemeClr>
+          </a:lnRef>
+          <a:fillRef idx="1">
+            <a:schemeClr val="accent1"/>
+          </a:fillRef>
+          <a:effectRef idx="0">
+            <a:schemeClr val="accent1"/>
+          </a:effectRef>
+          <a:fontRef idx="minor">
+            <a:schemeClr val="lt1"/>
+          </a:fontRef>
+        </p:style>
+        <p:txBody>
+          <a:bodyPr rtlCol="0" anchor="ctr"/>
+          <a:lstStyle/>
+          <a:p>
+            <a:pPr algn="ctr"/>
+            <a:endParaRPr kumimoji="1" lang="ja-JP" altLang="en-US" dirty="0" smtClean="0">
+              <a:solidFill>
+                <a:schemeClr val="tx1">
+                  <a:lumMod val="75000"/>
+                  <a:lumOff val="25000"/>
+                </a:schemeClr>
+              </a:solidFill>
+            </a:endParaRPr>
+          </a:p>
+        </p:txBody>
+      </p:sp>
+      <p:cxnSp>
+        <p:nvCxnSpPr>
+          <p:cNvPr id="79" name="カギ線コネクタ 78"/>
+          <p:cNvCxnSpPr>
+            <a:stCxn id="75" idx="3"/>
+            <a:endCxn id="76" idx="1"/>
+          </p:cNvCxnSpPr>
+          <p:nvPr/>
+        </p:nvCxnSpPr>
+        <p:spPr>
+          <a:xfrm flipV="1">
+            <a:off x="2771800" y="2133365"/>
+            <a:ext cx="341564" cy="168300"/>
+          </a:xfrm>
+          <a:prstGeom prst="bentConnector3">
+            <a:avLst>
+              <a:gd name="adj1" fmla="val 50000"/>
+            </a:avLst>
+          </a:prstGeom>
+          <a:ln w="15875">
+            <a:solidFill>
+              <a:schemeClr val="tx1">
+                <a:lumMod val="75000"/>
+                <a:lumOff val="25000"/>
+              </a:schemeClr>
+            </a:solidFill>
+            <a:headEnd type="arrow"/>
+            <a:tailEnd type="none"/>
+          </a:ln>
+        </p:spPr>
+        <p:style>
+          <a:lnRef idx="1">
+            <a:schemeClr val="accent1"/>
+          </a:lnRef>
+          <a:fillRef idx="0">
+            <a:schemeClr val="accent1"/>
+          </a:fillRef>
+          <a:effectRef idx="0">
+            <a:schemeClr val="accent1"/>
+          </a:effectRef>
+          <a:fontRef idx="minor">
+            <a:schemeClr val="tx1"/>
+          </a:fontRef>
+        </p:style>
+      </p:cxnSp>
+      <p:sp>
+        <p:nvSpPr>
+          <p:cNvPr id="85" name="テキスト ボックス 84"/>
+          <p:cNvSpPr txBox="1"/>
+          <p:nvPr/>
+        </p:nvSpPr>
+        <p:spPr>
+          <a:xfrm>
+            <a:off x="2942582" y="2455004"/>
+            <a:ext cx="3744416" cy="253916"/>
+          </a:xfrm>
+          <a:prstGeom prst="rect">
+            <a:avLst/>
+          </a:prstGeom>
+          <a:noFill/>
+        </p:spPr>
+        <p:txBody>
+          <a:bodyPr wrap="square" rtlCol="0">
+            <a:spAutoFit/>
+          </a:bodyPr>
+          <a:lstStyle/>
+          <a:p>
+            <a:r>
+              <a:rPr lang="en-US" altLang="ja-JP" sz="1050" dirty="0" smtClean="0">
+                <a:solidFill>
+                  <a:schemeClr val="tx1">
+                    <a:lumMod val="75000"/>
+                    <a:lumOff val="25000"/>
+                  </a:schemeClr>
+                </a:solidFill>
+              </a:rPr>
+              <a:t>CSV data </a:t>
+            </a:r>
+            <a:r>
+              <a:rPr lang="en-US" altLang="ja-JP" sz="1050" dirty="0">
+                <a:solidFill>
+                  <a:schemeClr val="tx1">
+                    <a:lumMod val="75000"/>
+                    <a:lumOff val="25000"/>
+                  </a:schemeClr>
+                </a:solidFill>
+              </a:rPr>
+              <a:t>are embedded </a:t>
+            </a:r>
+            <a:r>
+              <a:rPr lang="en-US" altLang="ja-JP" sz="1050" dirty="0" smtClean="0">
+                <a:solidFill>
+                  <a:schemeClr val="tx1">
+                    <a:lumMod val="75000"/>
+                    <a:lumOff val="25000"/>
+                  </a:schemeClr>
+                </a:solidFill>
+              </a:rPr>
+              <a:t> in  the </a:t>
+            </a:r>
+            <a:r>
+              <a:rPr lang="en-US" altLang="ja-JP" sz="1050" dirty="0" err="1" smtClean="0">
+                <a:solidFill>
+                  <a:schemeClr val="tx1">
+                    <a:lumMod val="75000"/>
+                    <a:lumOff val="25000"/>
+                  </a:schemeClr>
+                </a:solidFill>
+              </a:rPr>
+              <a:t>conf</a:t>
+            </a:r>
+            <a:r>
+              <a:rPr lang="en-US" altLang="ja-JP" sz="1050" dirty="0" smtClean="0">
+                <a:solidFill>
+                  <a:schemeClr val="tx1">
+                    <a:lumMod val="75000"/>
+                    <a:lumOff val="25000"/>
+                  </a:schemeClr>
+                </a:solidFill>
+              </a:rPr>
+              <a:t>  file.</a:t>
+            </a:r>
+          </a:p>
+        </p:txBody>
+      </p:sp>
+      <p:sp>
+        <p:nvSpPr>
+          <p:cNvPr id="86" name="円柱 85"/>
+          <p:cNvSpPr/>
+          <p:nvPr/>
+        </p:nvSpPr>
+        <p:spPr>
+          <a:xfrm>
+            <a:off x="5494127" y="4293096"/>
+            <a:ext cx="878073" cy="612658"/>
+          </a:xfrm>
+          <a:prstGeom prst="can">
+            <a:avLst/>
+          </a:prstGeom>
+          <a:solidFill>
+            <a:schemeClr val="bg2"/>
+          </a:solidFill>
+          <a:ln>
+            <a:solidFill>
+              <a:schemeClr val="tx1">
+                <a:lumMod val="75000"/>
+                <a:lumOff val="25000"/>
+              </a:schemeClr>
+            </a:solidFill>
+          </a:ln>
+        </p:spPr>
+        <p:style>
+          <a:lnRef idx="2">
+            <a:schemeClr val="accent1">
+              <a:shade val="50000"/>
+            </a:schemeClr>
+          </a:lnRef>
+          <a:fillRef idx="1">
+            <a:schemeClr val="accent1"/>
+          </a:fillRef>
+          <a:effectRef idx="0">
+            <a:schemeClr val="accent1"/>
+          </a:effectRef>
+          <a:fontRef idx="minor">
+            <a:schemeClr val="lt1"/>
+          </a:fontRef>
+        </p:style>
+        <p:txBody>
+          <a:bodyPr rtlCol="0" anchor="ctr"/>
+          <a:lstStyle/>
+          <a:p>
+            <a:pPr algn="ctr"/>
+            <a:r>
+              <a:rPr kumimoji="1" lang="en-US" altLang="ja-JP" sz="1200" dirty="0" smtClean="0">
+                <a:solidFill>
+                  <a:schemeClr val="tx1">
+                    <a:lumMod val="75000"/>
+                    <a:lumOff val="25000"/>
+                  </a:schemeClr>
+                </a:solidFill>
+              </a:rPr>
+              <a:t>Model</a:t>
+            </a:r>
+          </a:p>
+          <a:p>
+            <a:pPr algn="ctr"/>
+            <a:r>
+              <a:rPr lang="en-US" altLang="ja-JP" sz="1200" dirty="0" smtClean="0">
+                <a:solidFill>
+                  <a:schemeClr val="tx1">
+                    <a:lumMod val="75000"/>
+                    <a:lumOff val="25000"/>
+                  </a:schemeClr>
+                </a:solidFill>
+              </a:rPr>
+              <a:t>(</a:t>
+            </a:r>
+            <a:r>
+              <a:rPr lang="en-US" altLang="ja-JP" sz="1200" dirty="0" err="1" smtClean="0">
+                <a:solidFill>
+                  <a:schemeClr val="tx1">
+                    <a:lumMod val="75000"/>
+                    <a:lumOff val="25000"/>
+                  </a:schemeClr>
+                </a:solidFill>
+              </a:rPr>
+              <a:t>OpenNLP</a:t>
+            </a:r>
+            <a:r>
+              <a:rPr lang="en-US" altLang="ja-JP" sz="1200" dirty="0" smtClean="0">
+                <a:solidFill>
+                  <a:schemeClr val="tx1">
+                    <a:lumMod val="75000"/>
+                    <a:lumOff val="25000"/>
+                  </a:schemeClr>
+                </a:solidFill>
+              </a:rPr>
+              <a:t>)</a:t>
+            </a:r>
+            <a:endParaRPr lang="en-US" altLang="ja-JP" sz="1200" dirty="0">
+              <a:solidFill>
+                <a:schemeClr val="tx1">
+                  <a:lumMod val="75000"/>
+                  <a:lumOff val="25000"/>
+                </a:schemeClr>
+              </a:solidFill>
+            </a:endParaRPr>
+          </a:p>
+        </p:txBody>
+      </p:sp>
+      <p:cxnSp>
+        <p:nvCxnSpPr>
+          <p:cNvPr id="89" name="カギ線コネクタ 88"/>
+          <p:cNvCxnSpPr>
+            <a:stCxn id="74" idx="3"/>
+            <a:endCxn id="86" idx="2"/>
+          </p:cNvCxnSpPr>
+          <p:nvPr/>
+        </p:nvCxnSpPr>
+        <p:spPr>
+          <a:xfrm>
+            <a:off x="5148064" y="3988139"/>
+            <a:ext cx="346063" cy="611286"/>
+          </a:xfrm>
+          <a:prstGeom prst="bentConnector3">
+            <a:avLst>
+              <a:gd name="adj1" fmla="val 50000"/>
+            </a:avLst>
+          </a:prstGeom>
+          <a:ln w="15875">
+            <a:solidFill>
+              <a:schemeClr val="tx1">
+                <a:lumMod val="75000"/>
+                <a:lumOff val="25000"/>
+              </a:schemeClr>
+            </a:solidFill>
+            <a:headEnd type="none"/>
+            <a:tailEnd type="none"/>
+          </a:ln>
+        </p:spPr>
+        <p:style>
+          <a:lnRef idx="1">
+            <a:schemeClr val="accent1"/>
+          </a:lnRef>
+          <a:fillRef idx="0">
+            <a:schemeClr val="accent1"/>
+          </a:fillRef>
+          <a:effectRef idx="0">
+            <a:schemeClr val="accent1"/>
+          </a:effectRef>
+          <a:fontRef idx="minor">
+            <a:schemeClr val="tx1"/>
+          </a:fontRef>
+        </p:style>
+      </p:cxnSp>
+      <p:cxnSp>
+        <p:nvCxnSpPr>
+          <p:cNvPr id="93" name="カギ線コネクタ 92"/>
+          <p:cNvCxnSpPr>
+            <a:stCxn id="20" idx="3"/>
+            <a:endCxn id="86" idx="2"/>
+          </p:cNvCxnSpPr>
+          <p:nvPr/>
+        </p:nvCxnSpPr>
+        <p:spPr>
+          <a:xfrm>
+            <a:off x="5148063" y="4567546"/>
+            <a:ext cx="346064" cy="31879"/>
+          </a:xfrm>
+          <a:prstGeom prst="bentConnector3">
+            <a:avLst>
+              <a:gd name="adj1" fmla="val 50000"/>
+            </a:avLst>
+          </a:prstGeom>
+          <a:ln w="15875">
+            <a:solidFill>
+              <a:schemeClr val="tx1">
+                <a:lumMod val="75000"/>
+                <a:lumOff val="25000"/>
+              </a:schemeClr>
+            </a:solidFill>
+            <a:headEnd type="none"/>
+            <a:tailEnd type="none"/>
+          </a:ln>
+        </p:spPr>
+        <p:style>
+          <a:lnRef idx="1">
+            <a:schemeClr val="accent1"/>
+          </a:lnRef>
+          <a:fillRef idx="0">
+            <a:schemeClr val="accent1"/>
+          </a:fillRef>
+          <a:effectRef idx="0">
+            <a:schemeClr val="accent1"/>
+          </a:effectRef>
+          <a:fontRef idx="minor">
+            <a:schemeClr val="tx1"/>
+          </a:fontRef>
+        </p:style>
+      </p:cxnSp>
+      <p:cxnSp>
+        <p:nvCxnSpPr>
+          <p:cNvPr id="96" name="カギ線コネクタ 95"/>
+          <p:cNvCxnSpPr>
+            <a:stCxn id="28" idx="3"/>
+            <a:endCxn id="86" idx="2"/>
+          </p:cNvCxnSpPr>
+          <p:nvPr/>
+        </p:nvCxnSpPr>
+        <p:spPr>
+          <a:xfrm flipV="1">
+            <a:off x="5148063" y="4599425"/>
+            <a:ext cx="346064" cy="398692"/>
+          </a:xfrm>
+          <a:prstGeom prst="bentConnector3">
+            <a:avLst>
+              <a:gd name="adj1" fmla="val 50000"/>
+            </a:avLst>
+          </a:prstGeom>
+          <a:ln w="15875">
+            <a:solidFill>
+              <a:schemeClr val="tx1">
+                <a:lumMod val="75000"/>
+                <a:lumOff val="25000"/>
+              </a:schemeClr>
+            </a:solidFill>
+            <a:headEnd type="none"/>
+            <a:tailEnd type="none"/>
+          </a:ln>
+        </p:spPr>
+        <p:style>
+          <a:lnRef idx="1">
+            <a:schemeClr val="accent1"/>
+          </a:lnRef>
+          <a:fillRef idx="0">
+            <a:schemeClr val="accent1"/>
+          </a:fillRef>
+          <a:effectRef idx="0">
+            <a:schemeClr val="accent1"/>
+          </a:effectRef>
+          <a:fontRef idx="minor">
+            <a:schemeClr val="tx1"/>
+          </a:fontRef>
+        </p:style>
+      </p:cxnSp>
+    </p:spTree>
+    <p:extLst>
+      <p:ext uri="{BB962C8B-B14F-4D97-AF65-F5344CB8AC3E}">
+        <p14:creationId xmlns:p14="http://schemas.microsoft.com/office/powerpoint/2010/main" val="1939843203"/>
+      </p:ext>
+    </p:extLst>
+  </p:cSld>
+  <p:clrMapOvr>
+    <a:masterClrMapping/>
+  </p:clrMapOvr>
+  <p:timing>
+    <p:tnLst>
+      <p:par>
+        <p:cTn id="1" dur="indefinite" restart="never" nodeType="tmRoot"/>
       </p:par>
     </p:tnLst>
   </p:timing>
@@ -6617,18 +9418,7 @@
                   </a:schemeClr>
                 </a:solidFill>
               </a:rPr>
-              <a:t>Learning-</a:t>
-            </a:r>
-            <a:r>
-              <a:rPr lang="en-US" altLang="ja-JP" sz="1400" b="1" dirty="0" smtClean="0">
-                <a:solidFill>
-                  <a:schemeClr val="tx1">
-                    <a:lumMod val="75000"/>
-                    <a:lumOff val="25000"/>
-                  </a:schemeClr>
-                </a:solidFill>
-              </a:rPr>
-              <a:t>to-rank Tool</a:t>
+              <a:t>Learning-to-rank Tool</a:t>
             </a:r>
             <a:endParaRPr kumimoji="1" lang="ja-JP" altLang="en-US" sz="1400" b="1" dirty="0" smtClean="0">
               <a:solidFill>
@@ -6935,7 +9725,7 @@
   <p:timing>
     <p:tnLst>
       <p:par>
-        <p:cTn xmlns:p14="http://schemas.microsoft.com/office/powerpoint/2010/main" id="1" dur="indefinite" restart="never" nodeType="tmRoot"/>
+        <p:cTn id="1" dur="indefinite" restart="never" nodeType="tmRoot"/>
       </p:par>
     </p:tnLst>
   </p:timing>

</xml_diff>